<commit_message>
Add instruction to docs for Linux users for specific arguments to use in v6 dev
</commit_message>
<xml_diff>
--- a/slides/chapter7_algorithm_development.pptx
+++ b/slides/chapter7_algorithm_development.pptx
@@ -151,14 +151,6 @@
 <p188:authorLst xmlns:a="http://schemas.openxmlformats.org/drawingml/2006/main" xmlns:r="http://schemas.openxmlformats.org/officeDocument/2006/relationships" xmlns:p188="http://schemas.microsoft.com/office/powerpoint/2018/8/main">
   <p188:author id="{1EF79579-3D0F-D3EF-A63F-03EE2F34BFF5}" name="Bart van Beusekom" initials="Bv" userId="S::b.vanbeusekom@IKNL.NL::cce58229-8402-4bf0-84e6-67599d6a2b64" providerId="AD"/>
 </p188:authorLst>
-</file>
-
-<file path=ppt/revisionInfo.xml><?xml version="1.0" encoding="utf-8"?>
-<p1510:revInfo xmlns:a="http://schemas.openxmlformats.org/drawingml/2006/main" xmlns:r="http://schemas.openxmlformats.org/officeDocument/2006/relationships" xmlns:p1510="http://schemas.microsoft.com/office/powerpoint/2015/10/main">
-  <p1510:revLst>
-    <p1510:client id="{42C6D2BD-5BFD-416B-A4D0-6D82C8492D7E}" v="81" dt="2024-09-17T13:18:17.366"/>
-  </p1510:revLst>
-</p1510:revInfo>
 </file>
 
 <file path=ppt/comments/modernComment_533_47BDD8B6.xml><?xml version="1.0" encoding="utf-8"?>
@@ -9500,10 +9492,10 @@
         </p:nvGrpSpPr>
         <p:grpSpPr>
           <a:xfrm>
-            <a:off x="3742742" y="5338360"/>
-            <a:ext cx="4706515" cy="1029134"/>
+            <a:off x="2569945" y="5338360"/>
+            <a:ext cx="7016817" cy="1162538"/>
             <a:chOff x="941689" y="864637"/>
-            <a:chExt cx="4323960" cy="890429"/>
+            <a:chExt cx="4323960" cy="1005853"/>
           </a:xfrm>
         </p:grpSpPr>
         <p:sp>
@@ -9527,7 +9519,7 @@
               <a:avLst/>
             </a:prstGeom>
             <a:solidFill>
-              <a:srgbClr val="FFC000"/>
+              <a:srgbClr val="FF0000"/>
             </a:solidFill>
             <a:ln>
               <a:noFill/>
@@ -9572,7 +9564,7 @@
           <p:spPr>
             <a:xfrm>
               <a:off x="1311216" y="991716"/>
-              <a:ext cx="3805143" cy="692367"/>
+              <a:ext cx="3805143" cy="878774"/>
             </a:xfrm>
             <a:prstGeom prst="rect">
               <a:avLst/>
@@ -9591,7 +9583,7 @@
                     <a:schemeClr val="bg1"/>
                   </a:solidFill>
                 </a:rPr>
-                <a:t>HINT</a:t>
+                <a:t>ALERT</a:t>
               </a:r>
               <a:br>
                 <a:rPr lang="en-GB" b="1" dirty="0">
@@ -9606,23 +9598,36 @@
                     <a:schemeClr val="bg1"/>
                   </a:solidFill>
                 </a:rPr>
-                <a:t>Remember to use help(</a:t>
+                <a:t>If you are using Linux without Docker desktop, you need to run:</a:t>
+              </a:r>
+            </a:p>
+            <a:p>
+              <a:r>
+                <a:rPr lang="en-GB" sz="1400" dirty="0">
+                  <a:solidFill>
+                    <a:schemeClr val="bg1"/>
+                  </a:solidFill>
+                  <a:latin typeface="Aptos Mono" panose="020B0009020202020204" pitchFamily="49" charset="0"/>
+                </a:rPr>
+                <a:t>v6 dev create-demo-network -–server-</a:t>
               </a:r>
               <a:r>
                 <a:rPr lang="en-GB" sz="1400" dirty="0" err="1">
                   <a:solidFill>
                     <a:schemeClr val="bg1"/>
                   </a:solidFill>
+                  <a:latin typeface="Aptos Mono" panose="020B0009020202020204" pitchFamily="49" charset="0"/>
                 </a:rPr>
-                <a:t>client.task.create</a:t>
+                <a:t>url</a:t>
               </a:r>
               <a:r>
                 <a:rPr lang="en-GB" sz="1400" dirty="0">
                   <a:solidFill>
                     <a:schemeClr val="bg1"/>
                   </a:solidFill>
+                  <a:latin typeface="Aptos Mono" panose="020B0009020202020204" pitchFamily="49" charset="0"/>
                 </a:rPr>
-                <a:t>) to find out which arguments you need to provide</a:t>
+                <a:t> http:172.17.0.1</a:t>
               </a:r>
             </a:p>
           </p:txBody>

</xml_diff>

<commit_message>
Updated slides lesson 7
</commit_message>
<xml_diff>
--- a/slides/chapter7_algorithm_development.pptx
+++ b/slides/chapter7_algorithm_development.pptx
@@ -5,7 +5,7 @@
     <p:sldMasterId id="2147483648" r:id="rId5"/>
   </p:sldMasterIdLst>
   <p:notesMasterIdLst>
-    <p:notesMasterId r:id="rId39"/>
+    <p:notesMasterId r:id="rId41"/>
   </p:notesMasterIdLst>
   <p:sldIdLst>
     <p:sldId id="1326" r:id="rId6"/>
@@ -17,30 +17,32 @@
     <p:sldId id="1323" r:id="rId12"/>
     <p:sldId id="1328" r:id="rId13"/>
     <p:sldId id="1327" r:id="rId14"/>
-    <p:sldId id="1329" r:id="rId15"/>
-    <p:sldId id="1330" r:id="rId16"/>
-    <p:sldId id="1332" r:id="rId17"/>
-    <p:sldId id="1331" r:id="rId18"/>
-    <p:sldId id="1351" r:id="rId19"/>
-    <p:sldId id="278" r:id="rId20"/>
-    <p:sldId id="279" r:id="rId21"/>
-    <p:sldId id="1333" r:id="rId22"/>
-    <p:sldId id="1334" r:id="rId23"/>
-    <p:sldId id="1335" r:id="rId24"/>
-    <p:sldId id="1336" r:id="rId25"/>
-    <p:sldId id="1337" r:id="rId26"/>
-    <p:sldId id="1338" r:id="rId27"/>
-    <p:sldId id="1339" r:id="rId28"/>
-    <p:sldId id="1341" r:id="rId29"/>
-    <p:sldId id="1342" r:id="rId30"/>
-    <p:sldId id="1343" r:id="rId31"/>
-    <p:sldId id="1352" r:id="rId32"/>
-    <p:sldId id="1344" r:id="rId33"/>
-    <p:sldId id="1345" r:id="rId34"/>
-    <p:sldId id="1346" r:id="rId35"/>
-    <p:sldId id="1347" r:id="rId36"/>
-    <p:sldId id="1348" r:id="rId37"/>
-    <p:sldId id="1349" r:id="rId38"/>
+    <p:sldId id="1353" r:id="rId15"/>
+    <p:sldId id="1354" r:id="rId16"/>
+    <p:sldId id="1329" r:id="rId17"/>
+    <p:sldId id="1330" r:id="rId18"/>
+    <p:sldId id="1332" r:id="rId19"/>
+    <p:sldId id="1331" r:id="rId20"/>
+    <p:sldId id="1351" r:id="rId21"/>
+    <p:sldId id="278" r:id="rId22"/>
+    <p:sldId id="279" r:id="rId23"/>
+    <p:sldId id="1333" r:id="rId24"/>
+    <p:sldId id="1334" r:id="rId25"/>
+    <p:sldId id="1335" r:id="rId26"/>
+    <p:sldId id="1336" r:id="rId27"/>
+    <p:sldId id="1337" r:id="rId28"/>
+    <p:sldId id="1338" r:id="rId29"/>
+    <p:sldId id="1339" r:id="rId30"/>
+    <p:sldId id="1341" r:id="rId31"/>
+    <p:sldId id="1342" r:id="rId32"/>
+    <p:sldId id="1343" r:id="rId33"/>
+    <p:sldId id="1352" r:id="rId34"/>
+    <p:sldId id="1344" r:id="rId35"/>
+    <p:sldId id="1345" r:id="rId36"/>
+    <p:sldId id="1346" r:id="rId37"/>
+    <p:sldId id="1347" r:id="rId38"/>
+    <p:sldId id="1348" r:id="rId39"/>
+    <p:sldId id="1349" r:id="rId40"/>
   </p:sldIdLst>
   <p:sldSz cx="12192000" cy="6858000"/>
   <p:notesSz cx="6858000" cy="9144000"/>
@@ -153,6 +155,14 @@
 </p188:authorLst>
 </file>
 
+<file path=ppt/revisionInfo.xml><?xml version="1.0" encoding="utf-8"?>
+<p1510:revInfo xmlns:a="http://schemas.openxmlformats.org/drawingml/2006/main" xmlns:r="http://schemas.openxmlformats.org/officeDocument/2006/relationships" xmlns:p1510="http://schemas.microsoft.com/office/powerpoint/2015/10/main">
+  <p1510:revLst>
+    <p1510:client id="{80F5452E-237B-4789-9925-27FF902DBBED}" v="2" dt="2024-10-01T12:24:37.749"/>
+  </p1510:revLst>
+</p1510:revInfo>
+</file>
+
 <file path=ppt/comments/modernComment_533_47BDD8B6.xml><?xml version="1.0" encoding="utf-8"?>
 <p188:cmLst xmlns:a="http://schemas.openxmlformats.org/drawingml/2006/main" xmlns:r="http://schemas.openxmlformats.org/officeDocument/2006/relationships" xmlns:p188="http://schemas.microsoft.com/office/powerpoint/2018/8/main">
   <p188:cm id="{9E466F6B-00BF-452E-B68C-ABA5A148394D}" authorId="{1EF79579-3D0F-D3EF-A63F-03EE2F34BFF5}" status="resolved" created="2024-09-17T07:01:42.312" complete="100000">
@@ -256,7 +266,7 @@
           <a:p>
             <a:fld id="{D2268F06-1F1A-45A1-8092-73757D89E4BC}" type="datetimeFigureOut">
               <a:rPr lang="en-GB" smtClean="0"/>
-              <a:t>17/09/2024</a:t>
+              <a:t>01/10/2024</a:t>
             </a:fld>
             <a:endParaRPr lang="en-GB"/>
           </a:p>
@@ -595,7 +605,7 @@
           <a:p>
             <a:fld id="{C78DDFF4-2107-45FA-9BFB-5A681BB7B766}" type="slidenum">
               <a:rPr lang="en-GB" smtClean="0"/>
-              <a:t>14</a:t>
+              <a:t>11</a:t>
             </a:fld>
             <a:endParaRPr lang="en-GB"/>
           </a:p>
@@ -604,7 +614,7 @@
     </p:spTree>
     <p:extLst>
       <p:ext uri="{BB962C8B-B14F-4D97-AF65-F5344CB8AC3E}">
-        <p14:creationId xmlns:p14="http://schemas.microsoft.com/office/powerpoint/2010/main" val="2570157786"/>
+        <p14:creationId xmlns:p14="http://schemas.microsoft.com/office/powerpoint/2010/main" val="643000964"/>
       </p:ext>
     </p:extLst>
   </p:cSld>
@@ -694,7 +704,7 @@
     </p:spTree>
     <p:extLst>
       <p:ext uri="{BB962C8B-B14F-4D97-AF65-F5344CB8AC3E}">
-        <p14:creationId xmlns:p14="http://schemas.microsoft.com/office/powerpoint/2010/main" val="2993241247"/>
+        <p14:creationId xmlns:p14="http://schemas.microsoft.com/office/powerpoint/2010/main" val="2570157786"/>
       </p:ext>
     </p:extLst>
   </p:cSld>
@@ -775,7 +785,7 @@
           <a:p>
             <a:fld id="{C78DDFF4-2107-45FA-9BFB-5A681BB7B766}" type="slidenum">
               <a:rPr lang="en-GB" smtClean="0"/>
-              <a:t>17</a:t>
+              <a:t>18</a:t>
             </a:fld>
             <a:endParaRPr lang="en-GB"/>
           </a:p>
@@ -784,7 +794,7 @@
     </p:spTree>
     <p:extLst>
       <p:ext uri="{BB962C8B-B14F-4D97-AF65-F5344CB8AC3E}">
-        <p14:creationId xmlns:p14="http://schemas.microsoft.com/office/powerpoint/2010/main" val="762846071"/>
+        <p14:creationId xmlns:p14="http://schemas.microsoft.com/office/powerpoint/2010/main" val="2993241247"/>
       </p:ext>
     </p:extLst>
   </p:cSld>
@@ -865,7 +875,7 @@
           <a:p>
             <a:fld id="{C78DDFF4-2107-45FA-9BFB-5A681BB7B766}" type="slidenum">
               <a:rPr lang="en-GB" smtClean="0"/>
-              <a:t>21</a:t>
+              <a:t>19</a:t>
             </a:fld>
             <a:endParaRPr lang="en-GB"/>
           </a:p>
@@ -874,7 +884,7 @@
     </p:spTree>
     <p:extLst>
       <p:ext uri="{BB962C8B-B14F-4D97-AF65-F5344CB8AC3E}">
-        <p14:creationId xmlns:p14="http://schemas.microsoft.com/office/powerpoint/2010/main" val="186353133"/>
+        <p14:creationId xmlns:p14="http://schemas.microsoft.com/office/powerpoint/2010/main" val="762846071"/>
       </p:ext>
     </p:extLst>
   </p:cSld>
@@ -955,7 +965,7 @@
           <a:p>
             <a:fld id="{C78DDFF4-2107-45FA-9BFB-5A681BB7B766}" type="slidenum">
               <a:rPr lang="en-GB" smtClean="0"/>
-              <a:t>24</a:t>
+              <a:t>23</a:t>
             </a:fld>
             <a:endParaRPr lang="en-GB"/>
           </a:p>
@@ -964,7 +974,7 @@
     </p:spTree>
     <p:extLst>
       <p:ext uri="{BB962C8B-B14F-4D97-AF65-F5344CB8AC3E}">
-        <p14:creationId xmlns:p14="http://schemas.microsoft.com/office/powerpoint/2010/main" val="3370901640"/>
+        <p14:creationId xmlns:p14="http://schemas.microsoft.com/office/powerpoint/2010/main" val="186353133"/>
       </p:ext>
     </p:extLst>
   </p:cSld>
@@ -1045,7 +1055,7 @@
           <a:p>
             <a:fld id="{C78DDFF4-2107-45FA-9BFB-5A681BB7B766}" type="slidenum">
               <a:rPr lang="en-GB" smtClean="0"/>
-              <a:t>25</a:t>
+              <a:t>26</a:t>
             </a:fld>
             <a:endParaRPr lang="en-GB"/>
           </a:p>
@@ -1054,7 +1064,7 @@
     </p:spTree>
     <p:extLst>
       <p:ext uri="{BB962C8B-B14F-4D97-AF65-F5344CB8AC3E}">
-        <p14:creationId xmlns:p14="http://schemas.microsoft.com/office/powerpoint/2010/main" val="210194397"/>
+        <p14:creationId xmlns:p14="http://schemas.microsoft.com/office/powerpoint/2010/main" val="3370901640"/>
       </p:ext>
     </p:extLst>
   </p:cSld>
@@ -1135,7 +1145,7 @@
           <a:p>
             <a:fld id="{C78DDFF4-2107-45FA-9BFB-5A681BB7B766}" type="slidenum">
               <a:rPr lang="en-GB" smtClean="0"/>
-              <a:t>29</a:t>
+              <a:t>27</a:t>
             </a:fld>
             <a:endParaRPr lang="en-GB"/>
           </a:p>
@@ -1144,7 +1154,7 @@
     </p:spTree>
     <p:extLst>
       <p:ext uri="{BB962C8B-B14F-4D97-AF65-F5344CB8AC3E}">
-        <p14:creationId xmlns:p14="http://schemas.microsoft.com/office/powerpoint/2010/main" val="2181064136"/>
+        <p14:creationId xmlns:p14="http://schemas.microsoft.com/office/powerpoint/2010/main" val="210194397"/>
       </p:ext>
     </p:extLst>
   </p:cSld>
@@ -1226,6 +1236,96 @@
             <a:fld id="{C78DDFF4-2107-45FA-9BFB-5A681BB7B766}" type="slidenum">
               <a:rPr lang="en-GB" smtClean="0"/>
               <a:t>31</a:t>
+            </a:fld>
+            <a:endParaRPr lang="en-GB"/>
+          </a:p>
+        </p:txBody>
+      </p:sp>
+    </p:spTree>
+    <p:extLst>
+      <p:ext uri="{BB962C8B-B14F-4D97-AF65-F5344CB8AC3E}">
+        <p14:creationId xmlns:p14="http://schemas.microsoft.com/office/powerpoint/2010/main" val="2181064136"/>
+      </p:ext>
+    </p:extLst>
+  </p:cSld>
+  <p:clrMapOvr>
+    <a:masterClrMapping/>
+  </p:clrMapOvr>
+</p:notes>
+</file>
+
+<file path=ppt/notesSlides/notesSlide9.xml><?xml version="1.0" encoding="utf-8"?>
+<p:notes xmlns:a="http://schemas.openxmlformats.org/drawingml/2006/main" xmlns:r="http://schemas.openxmlformats.org/officeDocument/2006/relationships" xmlns:p="http://schemas.openxmlformats.org/presentationml/2006/main">
+  <p:cSld>
+    <p:spTree>
+      <p:nvGrpSpPr>
+        <p:cNvPr id="1" name=""/>
+        <p:cNvGrpSpPr/>
+        <p:nvPr/>
+      </p:nvGrpSpPr>
+      <p:grpSpPr>
+        <a:xfrm>
+          <a:off x="0" y="0"/>
+          <a:ext cx="0" cy="0"/>
+          <a:chOff x="0" y="0"/>
+          <a:chExt cx="0" cy="0"/>
+        </a:xfrm>
+      </p:grpSpPr>
+      <p:sp>
+        <p:nvSpPr>
+          <p:cNvPr id="2" name="Slide Image Placeholder 1"/>
+          <p:cNvSpPr>
+            <a:spLocks noGrp="1" noRot="1" noChangeAspect="1"/>
+          </p:cNvSpPr>
+          <p:nvPr>
+            <p:ph type="sldImg"/>
+          </p:nvPr>
+        </p:nvSpPr>
+        <p:spPr/>
+      </p:sp>
+      <p:sp>
+        <p:nvSpPr>
+          <p:cNvPr id="3" name="Notes Placeholder 2"/>
+          <p:cNvSpPr>
+            <a:spLocks noGrp="1"/>
+          </p:cNvSpPr>
+          <p:nvPr>
+            <p:ph type="body" idx="1"/>
+          </p:nvPr>
+        </p:nvSpPr>
+        <p:spPr/>
+        <p:txBody>
+          <a:bodyPr/>
+          <a:lstStyle/>
+          <a:p>
+            <a:r>
+              <a:rPr lang="en-GB" dirty="0">
+                <a:hlinkClick r:id="rId3"/>
+              </a:rPr>
+              <a:t>Create beautiful images of your code (ray.so)</a:t>
+            </a:r>
+            <a:endParaRPr lang="en-GB" dirty="0"/>
+          </a:p>
+        </p:txBody>
+      </p:sp>
+      <p:sp>
+        <p:nvSpPr>
+          <p:cNvPr id="4" name="Slide Number Placeholder 3"/>
+          <p:cNvSpPr>
+            <a:spLocks noGrp="1"/>
+          </p:cNvSpPr>
+          <p:nvPr>
+            <p:ph type="sldNum" sz="quarter" idx="5"/>
+          </p:nvPr>
+        </p:nvSpPr>
+        <p:spPr/>
+        <p:txBody>
+          <a:bodyPr/>
+          <a:lstStyle/>
+          <a:p>
+            <a:fld id="{C78DDFF4-2107-45FA-9BFB-5A681BB7B766}" type="slidenum">
+              <a:rPr lang="en-GB" smtClean="0"/>
+              <a:t>33</a:t>
             </a:fld>
             <a:endParaRPr lang="en-GB"/>
           </a:p>
@@ -1393,7 +1493,7 @@
           <a:p>
             <a:fld id="{D57D2C4B-0719-41F0-A1B3-001E78AC4B17}" type="datetimeFigureOut">
               <a:rPr lang="en-GB" smtClean="0"/>
-              <a:t>17/09/2024</a:t>
+              <a:t>01/10/2024</a:t>
             </a:fld>
             <a:endParaRPr lang="en-GB"/>
           </a:p>
@@ -1593,7 +1693,7 @@
           <a:p>
             <a:fld id="{D57D2C4B-0719-41F0-A1B3-001E78AC4B17}" type="datetimeFigureOut">
               <a:rPr lang="en-GB" smtClean="0"/>
-              <a:t>17/09/2024</a:t>
+              <a:t>01/10/2024</a:t>
             </a:fld>
             <a:endParaRPr lang="en-GB"/>
           </a:p>
@@ -1803,7 +1903,7 @@
           <a:p>
             <a:fld id="{D57D2C4B-0719-41F0-A1B3-001E78AC4B17}" type="datetimeFigureOut">
               <a:rPr lang="en-GB" smtClean="0"/>
-              <a:t>17/09/2024</a:t>
+              <a:t>01/10/2024</a:t>
             </a:fld>
             <a:endParaRPr lang="en-GB"/>
           </a:p>
@@ -2003,7 +2103,7 @@
           <a:p>
             <a:fld id="{D57D2C4B-0719-41F0-A1B3-001E78AC4B17}" type="datetimeFigureOut">
               <a:rPr lang="en-GB" smtClean="0"/>
-              <a:t>17/09/2024</a:t>
+              <a:t>01/10/2024</a:t>
             </a:fld>
             <a:endParaRPr lang="en-GB"/>
           </a:p>
@@ -2277,7 +2377,7 @@
           <a:p>
             <a:fld id="{D57D2C4B-0719-41F0-A1B3-001E78AC4B17}" type="datetimeFigureOut">
               <a:rPr lang="en-GB" smtClean="0"/>
-              <a:t>17/09/2024</a:t>
+              <a:t>01/10/2024</a:t>
             </a:fld>
             <a:endParaRPr lang="en-GB"/>
           </a:p>
@@ -2545,7 +2645,7 @@
           <a:p>
             <a:fld id="{D57D2C4B-0719-41F0-A1B3-001E78AC4B17}" type="datetimeFigureOut">
               <a:rPr lang="en-GB" smtClean="0"/>
-              <a:t>17/09/2024</a:t>
+              <a:t>01/10/2024</a:t>
             </a:fld>
             <a:endParaRPr lang="en-GB"/>
           </a:p>
@@ -2960,7 +3060,7 @@
           <a:p>
             <a:fld id="{D57D2C4B-0719-41F0-A1B3-001E78AC4B17}" type="datetimeFigureOut">
               <a:rPr lang="en-GB" smtClean="0"/>
-              <a:t>17/09/2024</a:t>
+              <a:t>01/10/2024</a:t>
             </a:fld>
             <a:endParaRPr lang="en-GB"/>
           </a:p>
@@ -3102,7 +3202,7 @@
           <a:p>
             <a:fld id="{D57D2C4B-0719-41F0-A1B3-001E78AC4B17}" type="datetimeFigureOut">
               <a:rPr lang="en-GB" smtClean="0"/>
-              <a:t>17/09/2024</a:t>
+              <a:t>01/10/2024</a:t>
             </a:fld>
             <a:endParaRPr lang="en-GB"/>
           </a:p>
@@ -3215,7 +3315,7 @@
           <a:p>
             <a:fld id="{D57D2C4B-0719-41F0-A1B3-001E78AC4B17}" type="datetimeFigureOut">
               <a:rPr lang="en-GB" smtClean="0"/>
-              <a:t>17/09/2024</a:t>
+              <a:t>01/10/2024</a:t>
             </a:fld>
             <a:endParaRPr lang="en-GB"/>
           </a:p>
@@ -3528,7 +3628,7 @@
           <a:p>
             <a:fld id="{D57D2C4B-0719-41F0-A1B3-001E78AC4B17}" type="datetimeFigureOut">
               <a:rPr lang="en-GB" smtClean="0"/>
-              <a:t>17/09/2024</a:t>
+              <a:t>01/10/2024</a:t>
             </a:fld>
             <a:endParaRPr lang="en-GB"/>
           </a:p>
@@ -3821,7 +3921,7 @@
           <a:p>
             <a:fld id="{D57D2C4B-0719-41F0-A1B3-001E78AC4B17}" type="datetimeFigureOut">
               <a:rPr lang="en-GB" smtClean="0"/>
-              <a:t>17/09/2024</a:t>
+              <a:t>01/10/2024</a:t>
             </a:fld>
             <a:endParaRPr lang="en-GB"/>
           </a:p>
@@ -4063,7 +4163,7 @@
             <a:fld id="{D57D2C4B-0719-41F0-A1B3-001E78AC4B17}" type="datetimeFigureOut">
               <a:rPr lang="en-GB" smtClean="0"/>
               <a:pPr/>
-              <a:t>17/09/2024</a:t>
+              <a:t>01/10/2024</a:t>
             </a:fld>
             <a:endParaRPr lang="en-GB"/>
           </a:p>
@@ -4793,6 +4893,645 @@
           <p:cNvPr id="2" name="Title 1">
             <a:extLst>
               <a:ext uri="{FF2B5EF4-FFF2-40B4-BE49-F238E27FC236}">
+                <a16:creationId xmlns:a16="http://schemas.microsoft.com/office/drawing/2014/main" id="{862D2ABD-AF27-7607-0E45-ABFB48D2B3E4}"/>
+              </a:ext>
+            </a:extLst>
+          </p:cNvPr>
+          <p:cNvSpPr>
+            <a:spLocks noGrp="1"/>
+          </p:cNvSpPr>
+          <p:nvPr>
+            <p:ph type="title"/>
+          </p:nvPr>
+        </p:nvSpPr>
+        <p:spPr/>
+        <p:txBody>
+          <a:bodyPr/>
+          <a:lstStyle/>
+          <a:p>
+            <a:r>
+              <a:rPr lang="en-US" dirty="0"/>
+              <a:t>Creating non-Python algorithms</a:t>
+            </a:r>
+            <a:endParaRPr lang="nl-NL" dirty="0"/>
+          </a:p>
+        </p:txBody>
+      </p:sp>
+      <p:sp>
+        <p:nvSpPr>
+          <p:cNvPr id="3" name="Content Placeholder 2">
+            <a:extLst>
+              <a:ext uri="{FF2B5EF4-FFF2-40B4-BE49-F238E27FC236}">
+                <a16:creationId xmlns:a16="http://schemas.microsoft.com/office/drawing/2014/main" id="{D732AE9E-D1B6-8AA2-8332-4974CBEB3693}"/>
+              </a:ext>
+            </a:extLst>
+          </p:cNvPr>
+          <p:cNvSpPr>
+            <a:spLocks noGrp="1"/>
+          </p:cNvSpPr>
+          <p:nvPr>
+            <p:ph idx="1"/>
+          </p:nvPr>
+        </p:nvSpPr>
+        <p:spPr>
+          <a:xfrm>
+            <a:off x="838200" y="2093976"/>
+            <a:ext cx="10515600" cy="4082987"/>
+          </a:xfrm>
+        </p:spPr>
+        <p:txBody>
+          <a:bodyPr/>
+          <a:lstStyle/>
+          <a:p>
+            <a:pPr marL="0" indent="0">
+              <a:buNone/>
+            </a:pPr>
+            <a:r>
+              <a:rPr lang="en-US" dirty="0"/>
+              <a:t>You want to create a vantage6 algorithm, but Python is not your favorite programming language.</a:t>
+            </a:r>
+          </a:p>
+          <a:p>
+            <a:pPr marL="0" indent="0">
+              <a:buNone/>
+            </a:pPr>
+            <a:endParaRPr lang="en-US" dirty="0"/>
+          </a:p>
+          <a:p>
+            <a:pPr marL="0" indent="0">
+              <a:buNone/>
+            </a:pPr>
+            <a:r>
+              <a:rPr lang="nl-NL" dirty="0" err="1"/>
+              <a:t>What</a:t>
+            </a:r>
+            <a:r>
+              <a:rPr lang="nl-NL" dirty="0"/>
+              <a:t> extra </a:t>
+            </a:r>
+            <a:r>
+              <a:rPr lang="nl-NL" dirty="0" err="1"/>
+              <a:t>work</a:t>
+            </a:r>
+            <a:r>
+              <a:rPr lang="nl-NL" dirty="0"/>
+              <a:t> </a:t>
+            </a:r>
+            <a:r>
+              <a:rPr lang="nl-NL" dirty="0" err="1"/>
+              <a:t>would</a:t>
+            </a:r>
+            <a:r>
+              <a:rPr lang="nl-NL" dirty="0"/>
+              <a:t> </a:t>
+            </a:r>
+            <a:r>
+              <a:rPr lang="nl-NL" dirty="0" err="1"/>
+              <a:t>you</a:t>
+            </a:r>
+            <a:r>
+              <a:rPr lang="nl-NL" dirty="0"/>
+              <a:t> </a:t>
+            </a:r>
+            <a:r>
+              <a:rPr lang="nl-NL" dirty="0" err="1"/>
+              <a:t>need</a:t>
+            </a:r>
+            <a:r>
+              <a:rPr lang="nl-NL" dirty="0"/>
+              <a:t> </a:t>
+            </a:r>
+            <a:r>
+              <a:rPr lang="nl-NL" dirty="0" err="1"/>
+              <a:t>to</a:t>
+            </a:r>
+            <a:r>
+              <a:rPr lang="nl-NL" dirty="0"/>
+              <a:t> do </a:t>
+            </a:r>
+            <a:r>
+              <a:rPr lang="nl-NL" dirty="0" err="1"/>
+              <a:t>to</a:t>
+            </a:r>
+            <a:r>
+              <a:rPr lang="nl-NL" dirty="0"/>
+              <a:t> make </a:t>
+            </a:r>
+            <a:r>
+              <a:rPr lang="nl-NL" dirty="0" err="1"/>
+              <a:t>your</a:t>
+            </a:r>
+            <a:r>
+              <a:rPr lang="nl-NL" dirty="0"/>
+              <a:t> </a:t>
+            </a:r>
+            <a:r>
+              <a:rPr lang="nl-NL" dirty="0" err="1"/>
+              <a:t>algorithm</a:t>
+            </a:r>
+            <a:r>
+              <a:rPr lang="nl-NL" dirty="0"/>
+              <a:t> </a:t>
+            </a:r>
+            <a:r>
+              <a:rPr lang="nl-NL" dirty="0" err="1"/>
+              <a:t>communicate</a:t>
+            </a:r>
+            <a:r>
+              <a:rPr lang="nl-NL" dirty="0"/>
+              <a:t> </a:t>
+            </a:r>
+            <a:r>
+              <a:rPr lang="nl-NL" dirty="0" err="1"/>
+              <a:t>with</a:t>
+            </a:r>
+            <a:r>
+              <a:rPr lang="nl-NL" dirty="0"/>
+              <a:t> </a:t>
+            </a:r>
+            <a:r>
+              <a:rPr lang="nl-NL" dirty="0" err="1"/>
+              <a:t>the</a:t>
+            </a:r>
+            <a:r>
+              <a:rPr lang="nl-NL" dirty="0"/>
+              <a:t> vantage6 node?</a:t>
+            </a:r>
+          </a:p>
+        </p:txBody>
+      </p:sp>
+      <p:grpSp>
+        <p:nvGrpSpPr>
+          <p:cNvPr id="4" name="Group 3">
+            <a:extLst>
+              <a:ext uri="{FF2B5EF4-FFF2-40B4-BE49-F238E27FC236}">
+                <a16:creationId xmlns:a16="http://schemas.microsoft.com/office/drawing/2014/main" id="{2515F287-F5E5-A014-6F31-394F2B45F24E}"/>
+              </a:ext>
+            </a:extLst>
+          </p:cNvPr>
+          <p:cNvGrpSpPr/>
+          <p:nvPr/>
+        </p:nvGrpSpPr>
+        <p:grpSpPr>
+          <a:xfrm>
+            <a:off x="941689" y="999371"/>
+            <a:ext cx="1905026" cy="408020"/>
+            <a:chOff x="941689" y="999371"/>
+            <a:chExt cx="1905026" cy="408020"/>
+          </a:xfrm>
+        </p:grpSpPr>
+        <p:sp>
+          <p:nvSpPr>
+            <p:cNvPr id="5" name="Rectangle 4">
+              <a:extLst>
+                <a:ext uri="{FF2B5EF4-FFF2-40B4-BE49-F238E27FC236}">
+                  <a16:creationId xmlns:a16="http://schemas.microsoft.com/office/drawing/2014/main" id="{D4EC0F0E-4525-C0A9-F5A9-B122BB014E50}"/>
+                </a:ext>
+              </a:extLst>
+            </p:cNvPr>
+            <p:cNvSpPr/>
+            <p:nvPr/>
+          </p:nvSpPr>
+          <p:spPr>
+            <a:xfrm>
+              <a:off x="941689" y="999371"/>
+              <a:ext cx="1801512" cy="408020"/>
+            </a:xfrm>
+            <a:prstGeom prst="rect">
+              <a:avLst/>
+            </a:prstGeom>
+            <a:solidFill>
+              <a:srgbClr val="FFC000"/>
+            </a:solidFill>
+            <a:ln>
+              <a:noFill/>
+            </a:ln>
+          </p:spPr>
+          <p:style>
+            <a:lnRef idx="2">
+              <a:schemeClr val="accent1">
+                <a:shade val="15000"/>
+              </a:schemeClr>
+            </a:lnRef>
+            <a:fillRef idx="1">
+              <a:schemeClr val="accent1"/>
+            </a:fillRef>
+            <a:effectRef idx="0">
+              <a:schemeClr val="accent1"/>
+            </a:effectRef>
+            <a:fontRef idx="minor">
+              <a:schemeClr val="lt1"/>
+            </a:fontRef>
+          </p:style>
+          <p:txBody>
+            <a:bodyPr rtlCol="0" anchor="ctr"/>
+            <a:lstStyle/>
+            <a:p>
+              <a:endParaRPr lang="en-GB" dirty="0"/>
+            </a:p>
+          </p:txBody>
+        </p:sp>
+        <p:sp>
+          <p:nvSpPr>
+            <p:cNvPr id="6" name="TextBox 5">
+              <a:extLst>
+                <a:ext uri="{FF2B5EF4-FFF2-40B4-BE49-F238E27FC236}">
+                  <a16:creationId xmlns:a16="http://schemas.microsoft.com/office/drawing/2014/main" id="{C594F45B-9309-30C5-43F7-1A419982523D}"/>
+                </a:ext>
+              </a:extLst>
+            </p:cNvPr>
+            <p:cNvSpPr txBox="1"/>
+            <p:nvPr/>
+          </p:nvSpPr>
+          <p:spPr>
+            <a:xfrm>
+              <a:off x="1311217" y="1016698"/>
+              <a:ext cx="1535498" cy="369332"/>
+            </a:xfrm>
+            <a:prstGeom prst="rect">
+              <a:avLst/>
+            </a:prstGeom>
+            <a:noFill/>
+          </p:spPr>
+          <p:txBody>
+            <a:bodyPr wrap="square" rtlCol="0">
+              <a:spAutoFit/>
+            </a:bodyPr>
+            <a:lstStyle/>
+            <a:p>
+              <a:r>
+                <a:rPr lang="en-GB" b="1" dirty="0">
+                  <a:solidFill>
+                    <a:schemeClr val="bg1"/>
+                  </a:solidFill>
+                </a:rPr>
+                <a:t>CHALLENGE</a:t>
+              </a:r>
+            </a:p>
+          </p:txBody>
+        </p:sp>
+        <p:pic>
+          <p:nvPicPr>
+            <p:cNvPr id="7" name="Graphic 6" descr="Lightning bolt with solid fill">
+              <a:extLst>
+                <a:ext uri="{FF2B5EF4-FFF2-40B4-BE49-F238E27FC236}">
+                  <a16:creationId xmlns:a16="http://schemas.microsoft.com/office/drawing/2014/main" id="{2E2BA9A1-AEDC-86B2-F773-FC04A50A4959}"/>
+                </a:ext>
+              </a:extLst>
+            </p:cNvPr>
+            <p:cNvPicPr>
+              <a:picLocks noChangeAspect="1"/>
+            </p:cNvPicPr>
+            <p:nvPr/>
+          </p:nvPicPr>
+          <p:blipFill>
+            <a:blip r:embed="rId2">
+              <a:extLst>
+                <a:ext uri="{96DAC541-7B7A-43D3-8B79-37D633B846F1}">
+                  <asvg:svgBlip xmlns:asvg="http://schemas.microsoft.com/office/drawing/2016/SVG/main" r:embed="rId3"/>
+                </a:ext>
+              </a:extLst>
+            </a:blip>
+            <a:stretch>
+              <a:fillRect/>
+            </a:stretch>
+          </p:blipFill>
+          <p:spPr>
+            <a:xfrm>
+              <a:off x="1001543" y="1050785"/>
+              <a:ext cx="309674" cy="309674"/>
+            </a:xfrm>
+            <a:prstGeom prst="rect">
+              <a:avLst/>
+            </a:prstGeom>
+          </p:spPr>
+        </p:pic>
+      </p:grpSp>
+    </p:spTree>
+    <p:extLst>
+      <p:ext uri="{BB962C8B-B14F-4D97-AF65-F5344CB8AC3E}">
+        <p14:creationId xmlns:p14="http://schemas.microsoft.com/office/powerpoint/2010/main" val="467104524"/>
+      </p:ext>
+    </p:extLst>
+  </p:cSld>
+  <p:clrMapOvr>
+    <a:masterClrMapping/>
+  </p:clrMapOvr>
+</p:sld>
+</file>
+
+<file path=ppt/slides/slide11.xml><?xml version="1.0" encoding="utf-8"?>
+<p:sld xmlns:a="http://schemas.openxmlformats.org/drawingml/2006/main" xmlns:r="http://schemas.openxmlformats.org/officeDocument/2006/relationships" xmlns:p="http://schemas.openxmlformats.org/presentationml/2006/main">
+  <p:cSld>
+    <p:spTree>
+      <p:nvGrpSpPr>
+        <p:cNvPr id="1" name=""/>
+        <p:cNvGrpSpPr/>
+        <p:nvPr/>
+      </p:nvGrpSpPr>
+      <p:grpSpPr>
+        <a:xfrm>
+          <a:off x="0" y="0"/>
+          <a:ext cx="0" cy="0"/>
+          <a:chOff x="0" y="0"/>
+          <a:chExt cx="0" cy="0"/>
+        </a:xfrm>
+      </p:grpSpPr>
+      <p:sp>
+        <p:nvSpPr>
+          <p:cNvPr id="2" name="Title 1">
+            <a:extLst>
+              <a:ext uri="{FF2B5EF4-FFF2-40B4-BE49-F238E27FC236}">
+                <a16:creationId xmlns:a16="http://schemas.microsoft.com/office/drawing/2014/main" id="{4334AA9E-C72A-1BE9-785E-6FC19301086F}"/>
+              </a:ext>
+            </a:extLst>
+          </p:cNvPr>
+          <p:cNvSpPr>
+            <a:spLocks noGrp="1"/>
+          </p:cNvSpPr>
+          <p:nvPr>
+            <p:ph type="title"/>
+          </p:nvPr>
+        </p:nvSpPr>
+        <p:spPr/>
+        <p:txBody>
+          <a:bodyPr/>
+          <a:lstStyle/>
+          <a:p>
+            <a:r>
+              <a:rPr lang="en-US" dirty="0"/>
+              <a:t>Creating non-Python algorithms</a:t>
+            </a:r>
+            <a:endParaRPr lang="en-GB" dirty="0"/>
+          </a:p>
+        </p:txBody>
+      </p:sp>
+      <p:grpSp>
+        <p:nvGrpSpPr>
+          <p:cNvPr id="4" name="Group 3">
+            <a:extLst>
+              <a:ext uri="{FF2B5EF4-FFF2-40B4-BE49-F238E27FC236}">
+                <a16:creationId xmlns:a16="http://schemas.microsoft.com/office/drawing/2014/main" id="{18487E50-C1D7-043E-8B6D-12386C668CF1}"/>
+              </a:ext>
+            </a:extLst>
+          </p:cNvPr>
+          <p:cNvGrpSpPr/>
+          <p:nvPr/>
+        </p:nvGrpSpPr>
+        <p:grpSpPr>
+          <a:xfrm>
+            <a:off x="941689" y="999371"/>
+            <a:ext cx="1905026" cy="408020"/>
+            <a:chOff x="941689" y="999371"/>
+            <a:chExt cx="1905026" cy="408020"/>
+          </a:xfrm>
+        </p:grpSpPr>
+        <p:sp>
+          <p:nvSpPr>
+            <p:cNvPr id="5" name="Rectangle 4">
+              <a:extLst>
+                <a:ext uri="{FF2B5EF4-FFF2-40B4-BE49-F238E27FC236}">
+                  <a16:creationId xmlns:a16="http://schemas.microsoft.com/office/drawing/2014/main" id="{9338E37B-3974-10E0-DB11-8941D29F3F78}"/>
+                </a:ext>
+              </a:extLst>
+            </p:cNvPr>
+            <p:cNvSpPr/>
+            <p:nvPr/>
+          </p:nvSpPr>
+          <p:spPr>
+            <a:xfrm>
+              <a:off x="941689" y="999371"/>
+              <a:ext cx="1801512" cy="408020"/>
+            </a:xfrm>
+            <a:prstGeom prst="rect">
+              <a:avLst/>
+            </a:prstGeom>
+            <a:solidFill>
+              <a:srgbClr val="FFC000"/>
+            </a:solidFill>
+            <a:ln>
+              <a:noFill/>
+            </a:ln>
+          </p:spPr>
+          <p:style>
+            <a:lnRef idx="2">
+              <a:schemeClr val="accent1">
+                <a:shade val="15000"/>
+              </a:schemeClr>
+            </a:lnRef>
+            <a:fillRef idx="1">
+              <a:schemeClr val="accent1"/>
+            </a:fillRef>
+            <a:effectRef idx="0">
+              <a:schemeClr val="accent1"/>
+            </a:effectRef>
+            <a:fontRef idx="minor">
+              <a:schemeClr val="lt1"/>
+            </a:fontRef>
+          </p:style>
+          <p:txBody>
+            <a:bodyPr rtlCol="0" anchor="ctr"/>
+            <a:lstStyle/>
+            <a:p>
+              <a:endParaRPr lang="en-GB" dirty="0"/>
+            </a:p>
+          </p:txBody>
+        </p:sp>
+        <p:sp>
+          <p:nvSpPr>
+            <p:cNvPr id="6" name="TextBox 5">
+              <a:extLst>
+                <a:ext uri="{FF2B5EF4-FFF2-40B4-BE49-F238E27FC236}">
+                  <a16:creationId xmlns:a16="http://schemas.microsoft.com/office/drawing/2014/main" id="{9D52B937-DAA4-5E7E-EAFE-BFDD5B0096DD}"/>
+                </a:ext>
+              </a:extLst>
+            </p:cNvPr>
+            <p:cNvSpPr txBox="1"/>
+            <p:nvPr/>
+          </p:nvSpPr>
+          <p:spPr>
+            <a:xfrm>
+              <a:off x="1311217" y="1016698"/>
+              <a:ext cx="1535498" cy="369332"/>
+            </a:xfrm>
+            <a:prstGeom prst="rect">
+              <a:avLst/>
+            </a:prstGeom>
+            <a:noFill/>
+          </p:spPr>
+          <p:txBody>
+            <a:bodyPr wrap="square" rtlCol="0">
+              <a:spAutoFit/>
+            </a:bodyPr>
+            <a:lstStyle/>
+            <a:p>
+              <a:r>
+                <a:rPr lang="en-GB" b="1" dirty="0">
+                  <a:solidFill>
+                    <a:schemeClr val="bg1"/>
+                  </a:solidFill>
+                </a:rPr>
+                <a:t>SOLUTION</a:t>
+              </a:r>
+            </a:p>
+          </p:txBody>
+        </p:sp>
+        <p:pic>
+          <p:nvPicPr>
+            <p:cNvPr id="7" name="Graphic 6" descr="Lightning bolt with solid fill">
+              <a:extLst>
+                <a:ext uri="{FF2B5EF4-FFF2-40B4-BE49-F238E27FC236}">
+                  <a16:creationId xmlns:a16="http://schemas.microsoft.com/office/drawing/2014/main" id="{111785D8-D841-24C8-6D96-824592837FBC}"/>
+                </a:ext>
+              </a:extLst>
+            </p:cNvPr>
+            <p:cNvPicPr>
+              <a:picLocks noChangeAspect="1"/>
+            </p:cNvPicPr>
+            <p:nvPr/>
+          </p:nvPicPr>
+          <p:blipFill>
+            <a:blip r:embed="rId3">
+              <a:extLst>
+                <a:ext uri="{96DAC541-7B7A-43D3-8B79-37D633B846F1}">
+                  <asvg:svgBlip xmlns:asvg="http://schemas.microsoft.com/office/drawing/2016/SVG/main" r:embed="rId4"/>
+                </a:ext>
+              </a:extLst>
+            </a:blip>
+            <a:stretch>
+              <a:fillRect/>
+            </a:stretch>
+          </p:blipFill>
+          <p:spPr>
+            <a:xfrm>
+              <a:off x="1001543" y="1050785"/>
+              <a:ext cx="309674" cy="309674"/>
+            </a:xfrm>
+            <a:prstGeom prst="rect">
+              <a:avLst/>
+            </a:prstGeom>
+          </p:spPr>
+        </p:pic>
+      </p:grpSp>
+      <p:sp>
+        <p:nvSpPr>
+          <p:cNvPr id="3" name="Content Placeholder 2">
+            <a:extLst>
+              <a:ext uri="{FF2B5EF4-FFF2-40B4-BE49-F238E27FC236}">
+                <a16:creationId xmlns:a16="http://schemas.microsoft.com/office/drawing/2014/main" id="{DA007E20-F615-2D4B-6D54-61EF441E9B41}"/>
+              </a:ext>
+            </a:extLst>
+          </p:cNvPr>
+          <p:cNvSpPr>
+            <a:spLocks noGrp="1"/>
+          </p:cNvSpPr>
+          <p:nvPr>
+            <p:ph idx="1"/>
+          </p:nvPr>
+        </p:nvSpPr>
+        <p:spPr>
+          <a:xfrm>
+            <a:off x="838200" y="1809549"/>
+            <a:ext cx="8982456" cy="4367414"/>
+          </a:xfrm>
+        </p:spPr>
+        <p:txBody>
+          <a:bodyPr>
+            <a:normAutofit/>
+          </a:bodyPr>
+          <a:lstStyle/>
+          <a:p>
+            <a:pPr marL="0" indent="0">
+              <a:buNone/>
+            </a:pPr>
+            <a:r>
+              <a:rPr lang="en-US" dirty="0"/>
+              <a:t>You would need to implement parts of the wrapper and algorithm client yourself. </a:t>
+            </a:r>
+          </a:p>
+          <a:p>
+            <a:pPr marL="0" indent="0">
+              <a:buNone/>
+            </a:pPr>
+            <a:endParaRPr lang="en-US" dirty="0"/>
+          </a:p>
+          <a:p>
+            <a:r>
+              <a:rPr lang="en-US" dirty="0"/>
+              <a:t>You should use the environment variables to load the token, input and data</a:t>
+            </a:r>
+          </a:p>
+          <a:p>
+            <a:r>
+              <a:rPr lang="en-US" dirty="0"/>
+              <a:t>You should create your own HTTP requests to replace the algorithm client</a:t>
+            </a:r>
+          </a:p>
+          <a:p>
+            <a:r>
+              <a:rPr lang="en-US" dirty="0"/>
+              <a:t>You should make sure the output is written to the correct place</a:t>
+            </a:r>
+          </a:p>
+          <a:p>
+            <a:pPr marL="0" indent="0">
+              <a:buNone/>
+            </a:pPr>
+            <a:endParaRPr lang="en-US" dirty="0"/>
+          </a:p>
+          <a:p>
+            <a:endParaRPr lang="en-US" dirty="0"/>
+          </a:p>
+          <a:p>
+            <a:pPr marL="514350" indent="-514350">
+              <a:buAutoNum type="alphaUcParenR"/>
+            </a:pPr>
+            <a:endParaRPr lang="en-US" dirty="0"/>
+          </a:p>
+          <a:p>
+            <a:pPr lvl="1"/>
+            <a:endParaRPr lang="en-US" dirty="0"/>
+          </a:p>
+          <a:p>
+            <a:endParaRPr lang="nl-NL" dirty="0"/>
+          </a:p>
+        </p:txBody>
+      </p:sp>
+    </p:spTree>
+    <p:extLst>
+      <p:ext uri="{BB962C8B-B14F-4D97-AF65-F5344CB8AC3E}">
+        <p14:creationId xmlns:p14="http://schemas.microsoft.com/office/powerpoint/2010/main" val="1059478249"/>
+      </p:ext>
+    </p:extLst>
+  </p:cSld>
+  <p:clrMapOvr>
+    <a:masterClrMapping/>
+  </p:clrMapOvr>
+</p:sld>
+</file>
+
+<file path=ppt/slides/slide12.xml><?xml version="1.0" encoding="utf-8"?>
+<p:sld xmlns:a="http://schemas.openxmlformats.org/drawingml/2006/main" xmlns:r="http://schemas.openxmlformats.org/officeDocument/2006/relationships" xmlns:p="http://schemas.openxmlformats.org/presentationml/2006/main">
+  <p:cSld>
+    <p:spTree>
+      <p:nvGrpSpPr>
+        <p:cNvPr id="1" name=""/>
+        <p:cNvGrpSpPr/>
+        <p:nvPr/>
+      </p:nvGrpSpPr>
+      <p:grpSpPr>
+        <a:xfrm>
+          <a:off x="0" y="0"/>
+          <a:ext cx="0" cy="0"/>
+          <a:chOff x="0" y="0"/>
+          <a:chExt cx="0" cy="0"/>
+        </a:xfrm>
+      </p:grpSpPr>
+      <p:sp>
+        <p:nvSpPr>
+          <p:cNvPr id="2" name="Title 1">
+            <a:extLst>
+              <a:ext uri="{FF2B5EF4-FFF2-40B4-BE49-F238E27FC236}">
                 <a16:creationId xmlns:a16="http://schemas.microsoft.com/office/drawing/2014/main" id="{89F27D89-BF28-C555-9CF3-21982054D335}"/>
               </a:ext>
             </a:extLst>
@@ -5084,7 +5823,7 @@
 </p:sld>
 </file>
 
-<file path=ppt/slides/slide11.xml><?xml version="1.0" encoding="utf-8"?>
+<file path=ppt/slides/slide13.xml><?xml version="1.0" encoding="utf-8"?>
 <p:sld xmlns:a="http://schemas.openxmlformats.org/drawingml/2006/main" xmlns:r="http://schemas.openxmlformats.org/officeDocument/2006/relationships" xmlns:p="http://schemas.openxmlformats.org/presentationml/2006/main">
   <p:cSld>
     <p:spTree>
@@ -5607,7 +6346,7 @@
 </p:sld>
 </file>
 
-<file path=ppt/slides/slide12.xml><?xml version="1.0" encoding="utf-8"?>
+<file path=ppt/slides/slide14.xml><?xml version="1.0" encoding="utf-8"?>
 <p:sld xmlns:a="http://schemas.openxmlformats.org/drawingml/2006/main" xmlns:r="http://schemas.openxmlformats.org/officeDocument/2006/relationships" xmlns:p="http://schemas.openxmlformats.org/presentationml/2006/main">
   <p:cSld>
     <p:spTree>
@@ -6071,7 +6810,7 @@
 </p:sld>
 </file>
 
-<file path=ppt/slides/slide13.xml><?xml version="1.0" encoding="utf-8"?>
+<file path=ppt/slides/slide15.xml><?xml version="1.0" encoding="utf-8"?>
 <p:sld xmlns:a="http://schemas.openxmlformats.org/drawingml/2006/main" xmlns:r="http://schemas.openxmlformats.org/officeDocument/2006/relationships" xmlns:p="http://schemas.openxmlformats.org/presentationml/2006/main">
   <p:cSld>
     <p:spTree>
@@ -6181,7 +6920,7 @@
             </a:pPr>
             <a:r>
               <a:rPr lang="en-US" dirty="0"/>
-              <a:t>Test files</a:t>
+              <a:t>Scripts to test your algorithm functions</a:t>
             </a:r>
           </a:p>
           <a:p>
@@ -6372,7 +7111,7 @@
 </p:sld>
 </file>
 
-<file path=ppt/slides/slide14.xml><?xml version="1.0" encoding="utf-8"?>
+<file path=ppt/slides/slide16.xml><?xml version="1.0" encoding="utf-8"?>
 <p:sld xmlns:a="http://schemas.openxmlformats.org/drawingml/2006/main" xmlns:r="http://schemas.openxmlformats.org/officeDocument/2006/relationships" xmlns:p="http://schemas.openxmlformats.org/presentationml/2006/main">
   <p:cSld>
     <p:spTree>
@@ -6651,7 +7390,7 @@
 </p:sld>
 </file>
 
-<file path=ppt/slides/slide15.xml><?xml version="1.0" encoding="utf-8"?>
+<file path=ppt/slides/slide17.xml><?xml version="1.0" encoding="utf-8"?>
 <p:sld xmlns:a="http://schemas.openxmlformats.org/drawingml/2006/main" xmlns:r="http://schemas.openxmlformats.org/officeDocument/2006/relationships" xmlns:p="http://schemas.openxmlformats.org/presentationml/2006/main">
   <p:cSld>
     <p:spTree>
@@ -6858,7 +7597,7 @@
         <p:spPr>
           <a:xfrm>
             <a:off x="838200" y="2151611"/>
-            <a:ext cx="9961346" cy="3275384"/>
+            <a:ext cx="9961346" cy="3737049"/>
           </a:xfrm>
           <a:prstGeom prst="rect">
             <a:avLst/>
@@ -6902,7 +7641,7 @@
                 </a:solidFill>
                 <a:latin typeface="Mulish"/>
               </a:rPr>
-              <a:t>Implement the central function to compute the final average</a:t>
+              <a:t>Implement the central function to aggregate those and compute the final average</a:t>
             </a:r>
           </a:p>
           <a:p>
@@ -6981,7 +7720,7 @@
                 </a:solidFill>
                 <a:latin typeface="Mulish"/>
               </a:rPr>
-              <a:t> column and compute it with </a:t>
+              <a:t> column and run it with </a:t>
             </a:r>
             <a:r>
               <a:rPr lang="en-GB" sz="2000" dirty="0">
@@ -6991,6 +7730,21 @@
                 <a:latin typeface="Aptos Mono" panose="020B0009020202020204" pitchFamily="49" charset="0"/>
               </a:rPr>
               <a:t>python test.py</a:t>
+            </a:r>
+          </a:p>
+          <a:p>
+            <a:pPr algn="ctr">
+              <a:lnSpc>
+                <a:spcPct val="150000"/>
+              </a:lnSpc>
+            </a:pPr>
+            <a:r>
+              <a:rPr lang="en-GB" sz="2000" dirty="0">
+                <a:solidFill>
+                  <a:srgbClr val="0F497B"/>
+                </a:solidFill>
+              </a:rPr>
+              <a:t>What is the average age?</a:t>
             </a:r>
           </a:p>
           <a:p>
@@ -7037,7 +7791,7 @@
         </p:nvGrpSpPr>
         <p:grpSpPr>
           <a:xfrm>
-            <a:off x="3834179" y="4982547"/>
+            <a:off x="3834179" y="5473436"/>
             <a:ext cx="4706515" cy="890429"/>
             <a:chOff x="941689" y="864637"/>
             <a:chExt cx="4323960" cy="890429"/>
@@ -7198,7 +7952,7 @@
 </p:sld>
 </file>
 
-<file path=ppt/slides/slide16.xml><?xml version="1.0" encoding="utf-8"?>
+<file path=ppt/slides/slide18.xml><?xml version="1.0" encoding="utf-8"?>
 <p:sld xmlns:a="http://schemas.openxmlformats.org/drawingml/2006/main" xmlns:r="http://schemas.openxmlformats.org/officeDocument/2006/relationships" xmlns:p="http://schemas.openxmlformats.org/presentationml/2006/main">
   <p:cSld>
     <p:spTree>
@@ -7517,7 +8271,7 @@
 </p:sld>
 </file>
 
-<file path=ppt/slides/slide17.xml><?xml version="1.0" encoding="utf-8"?>
+<file path=ppt/slides/slide19.xml><?xml version="1.0" encoding="utf-8"?>
 <p:sld xmlns:a="http://schemas.openxmlformats.org/drawingml/2006/main" xmlns:r="http://schemas.openxmlformats.org/officeDocument/2006/relationships" xmlns:p="http://schemas.openxmlformats.org/presentationml/2006/main">
   <p:cSld>
     <p:spTree>
@@ -7970,7 +8724,169 @@
 </p:sld>
 </file>
 
-<file path=ppt/slides/slide18.xml><?xml version="1.0" encoding="utf-8"?>
+<file path=ppt/slides/slide2.xml><?xml version="1.0" encoding="utf-8"?>
+<p:sld xmlns:a="http://schemas.openxmlformats.org/drawingml/2006/main" xmlns:r="http://schemas.openxmlformats.org/officeDocument/2006/relationships" xmlns:p="http://schemas.openxmlformats.org/presentationml/2006/main">
+  <p:cSld>
+    <p:spTree>
+      <p:nvGrpSpPr>
+        <p:cNvPr id="1" name=""/>
+        <p:cNvGrpSpPr/>
+        <p:nvPr/>
+      </p:nvGrpSpPr>
+      <p:grpSpPr>
+        <a:xfrm>
+          <a:off x="0" y="0"/>
+          <a:ext cx="0" cy="0"/>
+          <a:chOff x="0" y="0"/>
+          <a:chExt cx="0" cy="0"/>
+        </a:xfrm>
+      </p:grpSpPr>
+      <p:sp>
+        <p:nvSpPr>
+          <p:cNvPr id="2" name="Title 1">
+            <a:extLst>
+              <a:ext uri="{FF2B5EF4-FFF2-40B4-BE49-F238E27FC236}">
+                <a16:creationId xmlns:a16="http://schemas.microsoft.com/office/drawing/2014/main" id="{1DA35F1A-953B-EA0B-B2DA-0A855872A5B2}"/>
+              </a:ext>
+            </a:extLst>
+          </p:cNvPr>
+          <p:cNvSpPr>
+            <a:spLocks noGrp="1"/>
+          </p:cNvSpPr>
+          <p:nvPr>
+            <p:ph type="title"/>
+          </p:nvPr>
+        </p:nvSpPr>
+        <p:spPr/>
+        <p:txBody>
+          <a:bodyPr/>
+          <a:lstStyle/>
+          <a:p>
+            <a:r>
+              <a:rPr lang="en-GB" dirty="0"/>
+              <a:t>Overview</a:t>
+            </a:r>
+          </a:p>
+        </p:txBody>
+      </p:sp>
+      <p:sp>
+        <p:nvSpPr>
+          <p:cNvPr id="5" name="Text Placeholder 4">
+            <a:extLst>
+              <a:ext uri="{FF2B5EF4-FFF2-40B4-BE49-F238E27FC236}">
+                <a16:creationId xmlns:a16="http://schemas.microsoft.com/office/drawing/2014/main" id="{014DA56A-3ABE-84D1-71D9-15B41785840A}"/>
+              </a:ext>
+            </a:extLst>
+          </p:cNvPr>
+          <p:cNvSpPr>
+            <a:spLocks noGrp="1"/>
+          </p:cNvSpPr>
+          <p:nvPr>
+            <p:ph type="body" sz="quarter" idx="3"/>
+          </p:nvPr>
+        </p:nvSpPr>
+        <p:spPr>
+          <a:xfrm>
+            <a:off x="839788" y="1690688"/>
+            <a:ext cx="5183188" cy="823912"/>
+          </a:xfrm>
+        </p:spPr>
+        <p:txBody>
+          <a:bodyPr/>
+          <a:lstStyle/>
+          <a:p>
+            <a:r>
+              <a:rPr lang="en-GB" dirty="0"/>
+              <a:t>Objectives</a:t>
+            </a:r>
+          </a:p>
+        </p:txBody>
+      </p:sp>
+      <p:sp>
+        <p:nvSpPr>
+          <p:cNvPr id="6" name="Content Placeholder 5">
+            <a:extLst>
+              <a:ext uri="{FF2B5EF4-FFF2-40B4-BE49-F238E27FC236}">
+                <a16:creationId xmlns:a16="http://schemas.microsoft.com/office/drawing/2014/main" id="{0460BB27-607A-D917-8538-F87F20CC9BA9}"/>
+              </a:ext>
+            </a:extLst>
+          </p:cNvPr>
+          <p:cNvSpPr>
+            <a:spLocks noGrp="1"/>
+          </p:cNvSpPr>
+          <p:nvPr>
+            <p:ph sz="quarter" idx="4"/>
+          </p:nvPr>
+        </p:nvSpPr>
+        <p:spPr>
+          <a:xfrm>
+            <a:off x="839788" y="2514600"/>
+            <a:ext cx="7909576" cy="3684588"/>
+          </a:xfrm>
+        </p:spPr>
+        <p:txBody>
+          <a:bodyPr>
+            <a:normAutofit/>
+          </a:bodyPr>
+          <a:lstStyle/>
+          <a:p>
+            <a:r>
+              <a:rPr lang="en-GB" dirty="0"/>
+              <a:t>Understand vantage6 algorithm tools</a:t>
+            </a:r>
+          </a:p>
+          <a:p>
+            <a:r>
+              <a:rPr lang="en-GB" dirty="0"/>
+              <a:t>Create personalized boilerplate code</a:t>
+            </a:r>
+          </a:p>
+          <a:p>
+            <a:r>
+              <a:rPr lang="en-GB" dirty="0"/>
+              <a:t>Create simple algorithm</a:t>
+            </a:r>
+          </a:p>
+          <a:p>
+            <a:r>
+              <a:rPr lang="en-GB" dirty="0"/>
+              <a:t>Test algorithm</a:t>
+            </a:r>
+          </a:p>
+          <a:p>
+            <a:r>
+              <a:rPr lang="en-GB" dirty="0"/>
+              <a:t>Build algorithm Docker image</a:t>
+            </a:r>
+          </a:p>
+          <a:p>
+            <a:r>
+              <a:rPr lang="en-GB" dirty="0"/>
+              <a:t>Publish algorithm</a:t>
+            </a:r>
+          </a:p>
+          <a:p>
+            <a:r>
+              <a:rPr lang="en-GB" dirty="0"/>
+              <a:t>Run algorithm</a:t>
+            </a:r>
+          </a:p>
+        </p:txBody>
+      </p:sp>
+    </p:spTree>
+    <p:extLst>
+      <p:ext uri="{BB962C8B-B14F-4D97-AF65-F5344CB8AC3E}">
+        <p14:creationId xmlns:p14="http://schemas.microsoft.com/office/powerpoint/2010/main" val="1264432282"/>
+      </p:ext>
+    </p:extLst>
+  </p:cSld>
+  <p:clrMapOvr>
+    <a:masterClrMapping/>
+  </p:clrMapOvr>
+</p:sld>
+</file>
+
+<file path=ppt/slides/slide20.xml><?xml version="1.0" encoding="utf-8"?>
 <p:sld xmlns:a="http://schemas.openxmlformats.org/drawingml/2006/main" xmlns:r="http://schemas.openxmlformats.org/officeDocument/2006/relationships" xmlns:p="http://schemas.openxmlformats.org/presentationml/2006/main">
   <p:cSld>
     <p:spTree>
@@ -8778,7 +9694,7 @@
 </p:sld>
 </file>
 
-<file path=ppt/slides/slide19.xml><?xml version="1.0" encoding="utf-8"?>
+<file path=ppt/slides/slide21.xml><?xml version="1.0" encoding="utf-8"?>
 <p:sld xmlns:a="http://schemas.openxmlformats.org/drawingml/2006/main" xmlns:r="http://schemas.openxmlformats.org/officeDocument/2006/relationships" xmlns:p="http://schemas.openxmlformats.org/presentationml/2006/main">
   <p:cSld>
     <p:spTree>
@@ -8975,169 +9891,7 @@
 </p:sld>
 </file>
 
-<file path=ppt/slides/slide2.xml><?xml version="1.0" encoding="utf-8"?>
-<p:sld xmlns:a="http://schemas.openxmlformats.org/drawingml/2006/main" xmlns:r="http://schemas.openxmlformats.org/officeDocument/2006/relationships" xmlns:p="http://schemas.openxmlformats.org/presentationml/2006/main">
-  <p:cSld>
-    <p:spTree>
-      <p:nvGrpSpPr>
-        <p:cNvPr id="1" name=""/>
-        <p:cNvGrpSpPr/>
-        <p:nvPr/>
-      </p:nvGrpSpPr>
-      <p:grpSpPr>
-        <a:xfrm>
-          <a:off x="0" y="0"/>
-          <a:ext cx="0" cy="0"/>
-          <a:chOff x="0" y="0"/>
-          <a:chExt cx="0" cy="0"/>
-        </a:xfrm>
-      </p:grpSpPr>
-      <p:sp>
-        <p:nvSpPr>
-          <p:cNvPr id="2" name="Title 1">
-            <a:extLst>
-              <a:ext uri="{FF2B5EF4-FFF2-40B4-BE49-F238E27FC236}">
-                <a16:creationId xmlns:a16="http://schemas.microsoft.com/office/drawing/2014/main" id="{1DA35F1A-953B-EA0B-B2DA-0A855872A5B2}"/>
-              </a:ext>
-            </a:extLst>
-          </p:cNvPr>
-          <p:cNvSpPr>
-            <a:spLocks noGrp="1"/>
-          </p:cNvSpPr>
-          <p:nvPr>
-            <p:ph type="title"/>
-          </p:nvPr>
-        </p:nvSpPr>
-        <p:spPr/>
-        <p:txBody>
-          <a:bodyPr/>
-          <a:lstStyle/>
-          <a:p>
-            <a:r>
-              <a:rPr lang="en-GB" dirty="0"/>
-              <a:t>Overview</a:t>
-            </a:r>
-          </a:p>
-        </p:txBody>
-      </p:sp>
-      <p:sp>
-        <p:nvSpPr>
-          <p:cNvPr id="5" name="Text Placeholder 4">
-            <a:extLst>
-              <a:ext uri="{FF2B5EF4-FFF2-40B4-BE49-F238E27FC236}">
-                <a16:creationId xmlns:a16="http://schemas.microsoft.com/office/drawing/2014/main" id="{014DA56A-3ABE-84D1-71D9-15B41785840A}"/>
-              </a:ext>
-            </a:extLst>
-          </p:cNvPr>
-          <p:cNvSpPr>
-            <a:spLocks noGrp="1"/>
-          </p:cNvSpPr>
-          <p:nvPr>
-            <p:ph type="body" sz="quarter" idx="3"/>
-          </p:nvPr>
-        </p:nvSpPr>
-        <p:spPr>
-          <a:xfrm>
-            <a:off x="839788" y="1690688"/>
-            <a:ext cx="5183188" cy="823912"/>
-          </a:xfrm>
-        </p:spPr>
-        <p:txBody>
-          <a:bodyPr/>
-          <a:lstStyle/>
-          <a:p>
-            <a:r>
-              <a:rPr lang="en-GB" dirty="0"/>
-              <a:t>Objectives</a:t>
-            </a:r>
-          </a:p>
-        </p:txBody>
-      </p:sp>
-      <p:sp>
-        <p:nvSpPr>
-          <p:cNvPr id="6" name="Content Placeholder 5">
-            <a:extLst>
-              <a:ext uri="{FF2B5EF4-FFF2-40B4-BE49-F238E27FC236}">
-                <a16:creationId xmlns:a16="http://schemas.microsoft.com/office/drawing/2014/main" id="{0460BB27-607A-D917-8538-F87F20CC9BA9}"/>
-              </a:ext>
-            </a:extLst>
-          </p:cNvPr>
-          <p:cNvSpPr>
-            <a:spLocks noGrp="1"/>
-          </p:cNvSpPr>
-          <p:nvPr>
-            <p:ph sz="quarter" idx="4"/>
-          </p:nvPr>
-        </p:nvSpPr>
-        <p:spPr>
-          <a:xfrm>
-            <a:off x="839788" y="2514600"/>
-            <a:ext cx="7909576" cy="3684588"/>
-          </a:xfrm>
-        </p:spPr>
-        <p:txBody>
-          <a:bodyPr>
-            <a:normAutofit/>
-          </a:bodyPr>
-          <a:lstStyle/>
-          <a:p>
-            <a:r>
-              <a:rPr lang="en-GB" dirty="0"/>
-              <a:t>Understand vantage6 algorithm tools</a:t>
-            </a:r>
-          </a:p>
-          <a:p>
-            <a:r>
-              <a:rPr lang="en-GB" dirty="0"/>
-              <a:t>Create personalized boilerplate code</a:t>
-            </a:r>
-          </a:p>
-          <a:p>
-            <a:r>
-              <a:rPr lang="en-GB" dirty="0"/>
-              <a:t>Create simple algorithm</a:t>
-            </a:r>
-          </a:p>
-          <a:p>
-            <a:r>
-              <a:rPr lang="en-GB" dirty="0"/>
-              <a:t>Test algorithm</a:t>
-            </a:r>
-          </a:p>
-          <a:p>
-            <a:r>
-              <a:rPr lang="en-GB" dirty="0"/>
-              <a:t>Build algorithm Docker image</a:t>
-            </a:r>
-          </a:p>
-          <a:p>
-            <a:r>
-              <a:rPr lang="en-GB" dirty="0"/>
-              <a:t>Publish algorithm</a:t>
-            </a:r>
-          </a:p>
-          <a:p>
-            <a:r>
-              <a:rPr lang="en-GB" dirty="0"/>
-              <a:t>Run algorithm</a:t>
-            </a:r>
-          </a:p>
-        </p:txBody>
-      </p:sp>
-    </p:spTree>
-    <p:extLst>
-      <p:ext uri="{BB962C8B-B14F-4D97-AF65-F5344CB8AC3E}">
-        <p14:creationId xmlns:p14="http://schemas.microsoft.com/office/powerpoint/2010/main" val="1264432282"/>
-      </p:ext>
-    </p:extLst>
-  </p:cSld>
-  <p:clrMapOvr>
-    <a:masterClrMapping/>
-  </p:clrMapOvr>
-</p:sld>
-</file>
-
-<file path=ppt/slides/slide20.xml><?xml version="1.0" encoding="utf-8"?>
+<file path=ppt/slides/slide22.xml><?xml version="1.0" encoding="utf-8"?>
 <p:sld xmlns:a="http://schemas.openxmlformats.org/drawingml/2006/main" xmlns:r="http://schemas.openxmlformats.org/officeDocument/2006/relationships" xmlns:p="http://schemas.openxmlformats.org/presentationml/2006/main">
   <p:cSld>
     <p:spTree>
@@ -9718,7 +10472,7 @@
 </p:sld>
 </file>
 
-<file path=ppt/slides/slide21.xml><?xml version="1.0" encoding="utf-8"?>
+<file path=ppt/slides/slide23.xml><?xml version="1.0" encoding="utf-8"?>
 <p:sld xmlns:a="http://schemas.openxmlformats.org/drawingml/2006/main" xmlns:r="http://schemas.openxmlformats.org/officeDocument/2006/relationships" xmlns:p="http://schemas.openxmlformats.org/presentationml/2006/main">
   <p:cSld>
     <p:spTree>
@@ -10136,7 +10890,7 @@
 </p:sld>
 </file>
 
-<file path=ppt/slides/slide22.xml><?xml version="1.0" encoding="utf-8"?>
+<file path=ppt/slides/slide24.xml><?xml version="1.0" encoding="utf-8"?>
 <p:sld xmlns:a="http://schemas.openxmlformats.org/drawingml/2006/main" xmlns:r="http://schemas.openxmlformats.org/officeDocument/2006/relationships" xmlns:p="http://schemas.openxmlformats.org/presentationml/2006/main">
   <p:cSld>
     <p:spTree>
@@ -10420,7 +11174,7 @@
 </p:sld>
 </file>
 
-<file path=ppt/slides/slide23.xml><?xml version="1.0" encoding="utf-8"?>
+<file path=ppt/slides/slide25.xml><?xml version="1.0" encoding="utf-8"?>
 <p:sld xmlns:a="http://schemas.openxmlformats.org/drawingml/2006/main" xmlns:r="http://schemas.openxmlformats.org/officeDocument/2006/relationships" xmlns:p="http://schemas.openxmlformats.org/presentationml/2006/main">
   <p:cSld>
     <p:spTree>
@@ -11130,7 +11884,7 @@
 </p:sld>
 </file>
 
-<file path=ppt/slides/slide24.xml><?xml version="1.0" encoding="utf-8"?>
+<file path=ppt/slides/slide26.xml><?xml version="1.0" encoding="utf-8"?>
 <p:sld xmlns:a="http://schemas.openxmlformats.org/drawingml/2006/main" xmlns:r="http://schemas.openxmlformats.org/officeDocument/2006/relationships" xmlns:p="http://schemas.openxmlformats.org/presentationml/2006/main">
   <p:cSld>
     <p:spTree>
@@ -11482,7 +12236,7 @@
 </p:sld>
 </file>
 
-<file path=ppt/slides/slide25.xml><?xml version="1.0" encoding="utf-8"?>
+<file path=ppt/slides/slide27.xml><?xml version="1.0" encoding="utf-8"?>
 <p:sld xmlns:a="http://schemas.openxmlformats.org/drawingml/2006/main" xmlns:r="http://schemas.openxmlformats.org/officeDocument/2006/relationships" xmlns:p="http://schemas.openxmlformats.org/presentationml/2006/main">
   <p:cSld>
     <p:spTree>
@@ -11969,7 +12723,7 @@
 </p:sld>
 </file>
 
-<file path=ppt/slides/slide26.xml><?xml version="1.0" encoding="utf-8"?>
+<file path=ppt/slides/slide28.xml><?xml version="1.0" encoding="utf-8"?>
 <p:sld xmlns:a="http://schemas.openxmlformats.org/drawingml/2006/main" xmlns:r="http://schemas.openxmlformats.org/officeDocument/2006/relationships" xmlns:p="http://schemas.openxmlformats.org/presentationml/2006/main">
   <p:cSld>
     <p:spTree>
@@ -12267,7 +13021,7 @@
 </p:sld>
 </file>
 
-<file path=ppt/slides/slide27.xml><?xml version="1.0" encoding="utf-8"?>
+<file path=ppt/slides/slide29.xml><?xml version="1.0" encoding="utf-8"?>
 <p:sld xmlns:a="http://schemas.openxmlformats.org/drawingml/2006/main" xmlns:r="http://schemas.openxmlformats.org/officeDocument/2006/relationships" xmlns:p="http://schemas.openxmlformats.org/presentationml/2006/main">
   <p:cSld>
     <p:spTree>
@@ -12475,7 +13229,7 @@
         <p:spPr>
           <a:xfrm>
             <a:off x="838199" y="1791308"/>
-            <a:ext cx="8854441" cy="506292"/>
+            <a:ext cx="8854441" cy="1429622"/>
           </a:xfrm>
           <a:prstGeom prst="rect">
             <a:avLst/>
@@ -12488,10 +13242,12 @@
           </a:bodyPr>
           <a:lstStyle/>
           <a:p>
-            <a:pPr>
+            <a:pPr marL="342900" indent="-342900">
               <a:lnSpc>
                 <a:spcPct val="150000"/>
               </a:lnSpc>
+              <a:buFont typeface="Arial" panose="020B0604020202020204" pitchFamily="34" charset="0"/>
+              <a:buChar char="•"/>
             </a:pPr>
             <a:r>
               <a:rPr lang="en-GB" sz="2000" b="0" i="0" dirty="0">
@@ -12501,7 +13257,44 @@
                 <a:effectLst/>
                 <a:latin typeface="Mulish"/>
               </a:rPr>
-              <a:t>TODO</a:t>
+              <a:t>Average age – surprisingly – should still be 27.61</a:t>
+            </a:r>
+          </a:p>
+          <a:p>
+            <a:pPr marL="342900" indent="-342900">
+              <a:lnSpc>
+                <a:spcPct val="150000"/>
+              </a:lnSpc>
+              <a:buFont typeface="Arial" panose="020B0604020202020204" pitchFamily="34" charset="0"/>
+              <a:buChar char="•"/>
+            </a:pPr>
+            <a:r>
+              <a:rPr lang="en-GB" sz="2000" dirty="0">
+                <a:solidFill>
+                  <a:srgbClr val="0F497B"/>
+                </a:solidFill>
+                <a:latin typeface="Mulish"/>
+              </a:rPr>
+              <a:t>Average height is 178.5 (cm)</a:t>
+            </a:r>
+          </a:p>
+          <a:p>
+            <a:pPr marL="342900" indent="-342900">
+              <a:lnSpc>
+                <a:spcPct val="150000"/>
+              </a:lnSpc>
+              <a:buFont typeface="Arial" panose="020B0604020202020204" pitchFamily="34" charset="0"/>
+              <a:buChar char="•"/>
+            </a:pPr>
+            <a:r>
+              <a:rPr lang="en-GB" sz="2000" b="0" i="0" dirty="0">
+                <a:solidFill>
+                  <a:srgbClr val="0F497B"/>
+                </a:solidFill>
+                <a:effectLst/>
+                <a:latin typeface="Mulish"/>
+              </a:rPr>
+              <a:t>Average weight is 74.3 (kg)</a:t>
             </a:r>
           </a:p>
         </p:txBody>
@@ -12519,7 +13312,219 @@
 </p:sld>
 </file>
 
-<file path=ppt/slides/slide28.xml><?xml version="1.0" encoding="utf-8"?>
+<file path=ppt/slides/slide3.xml><?xml version="1.0" encoding="utf-8"?>
+<p:sld xmlns:a="http://schemas.openxmlformats.org/drawingml/2006/main" xmlns:r="http://schemas.openxmlformats.org/officeDocument/2006/relationships" xmlns:p="http://schemas.openxmlformats.org/presentationml/2006/main">
+  <p:cSld>
+    <p:spTree>
+      <p:nvGrpSpPr>
+        <p:cNvPr id="1" name=""/>
+        <p:cNvGrpSpPr/>
+        <p:nvPr/>
+      </p:nvGrpSpPr>
+      <p:grpSpPr>
+        <a:xfrm>
+          <a:off x="0" y="0"/>
+          <a:ext cx="0" cy="0"/>
+          <a:chOff x="0" y="0"/>
+          <a:chExt cx="0" cy="0"/>
+        </a:xfrm>
+      </p:grpSpPr>
+      <p:sp>
+        <p:nvSpPr>
+          <p:cNvPr id="4" name="Title 3">
+            <a:extLst>
+              <a:ext uri="{FF2B5EF4-FFF2-40B4-BE49-F238E27FC236}">
+                <a16:creationId xmlns:a16="http://schemas.microsoft.com/office/drawing/2014/main" id="{01556C73-952D-E378-3BAA-0914B6A56994}"/>
+              </a:ext>
+            </a:extLst>
+          </p:cNvPr>
+          <p:cNvSpPr>
+            <a:spLocks noGrp="1"/>
+          </p:cNvSpPr>
+          <p:nvPr>
+            <p:ph type="title"/>
+          </p:nvPr>
+        </p:nvSpPr>
+        <p:spPr/>
+        <p:txBody>
+          <a:bodyPr/>
+          <a:lstStyle/>
+          <a:p>
+            <a:r>
+              <a:rPr lang="en-US" dirty="0"/>
+              <a:t>Algorithm tools</a:t>
+            </a:r>
+            <a:endParaRPr lang="nl-NL" dirty="0"/>
+          </a:p>
+        </p:txBody>
+      </p:sp>
+      <p:sp>
+        <p:nvSpPr>
+          <p:cNvPr id="5" name="Content Placeholder 4">
+            <a:extLst>
+              <a:ext uri="{FF2B5EF4-FFF2-40B4-BE49-F238E27FC236}">
+                <a16:creationId xmlns:a16="http://schemas.microsoft.com/office/drawing/2014/main" id="{C64E3177-0198-CEBC-49F9-FD551DAA685B}"/>
+              </a:ext>
+            </a:extLst>
+          </p:cNvPr>
+          <p:cNvSpPr>
+            <a:spLocks noGrp="1"/>
+          </p:cNvSpPr>
+          <p:nvPr>
+            <p:ph sz="half" idx="1"/>
+          </p:nvPr>
+        </p:nvSpPr>
+        <p:spPr/>
+        <p:txBody>
+          <a:bodyPr>
+            <a:normAutofit lnSpcReduction="10000"/>
+          </a:bodyPr>
+          <a:lstStyle/>
+          <a:p>
+            <a:r>
+              <a:rPr lang="en-US" dirty="0"/>
+              <a:t>Algorithms need to communicate with the node and server</a:t>
+            </a:r>
+          </a:p>
+          <a:p>
+            <a:endParaRPr lang="en-US" dirty="0"/>
+          </a:p>
+          <a:p>
+            <a:r>
+              <a:rPr lang="nl-NL" dirty="0"/>
+              <a:t>Input </a:t>
+            </a:r>
+            <a:r>
+              <a:rPr lang="nl-NL" dirty="0" err="1"/>
+              <a:t>and</a:t>
+            </a:r>
+            <a:r>
+              <a:rPr lang="nl-NL" dirty="0"/>
+              <a:t> output are </a:t>
+            </a:r>
+            <a:r>
+              <a:rPr lang="nl-NL" dirty="0" err="1"/>
+              <a:t>handled</a:t>
+            </a:r>
+            <a:r>
+              <a:rPr lang="nl-NL" dirty="0"/>
+              <a:t> in standard way</a:t>
+            </a:r>
+          </a:p>
+          <a:p>
+            <a:endParaRPr lang="nl-NL" dirty="0"/>
+          </a:p>
+          <a:p>
+            <a:r>
+              <a:rPr lang="nl-NL" dirty="0" err="1"/>
+              <a:t>Algorithm</a:t>
+            </a:r>
+            <a:r>
+              <a:rPr lang="nl-NL" dirty="0"/>
+              <a:t> tools </a:t>
+            </a:r>
+            <a:r>
+              <a:rPr lang="nl-NL" dirty="0" err="1"/>
+              <a:t>provide</a:t>
+            </a:r>
+            <a:r>
+              <a:rPr lang="nl-NL" dirty="0"/>
+              <a:t> </a:t>
+            </a:r>
+            <a:r>
+              <a:rPr lang="nl-NL" dirty="0" err="1"/>
+              <a:t>this</a:t>
+            </a:r>
+            <a:r>
+              <a:rPr lang="nl-NL" dirty="0"/>
+              <a:t> </a:t>
+            </a:r>
+            <a:r>
+              <a:rPr lang="nl-NL" dirty="0" err="1"/>
+              <a:t>functionality</a:t>
+            </a:r>
+            <a:r>
+              <a:rPr lang="nl-NL" dirty="0"/>
+              <a:t> – </a:t>
+            </a:r>
+            <a:r>
+              <a:rPr lang="nl-NL" dirty="0" err="1"/>
+              <a:t>for</a:t>
+            </a:r>
+            <a:r>
+              <a:rPr lang="nl-NL" dirty="0"/>
+              <a:t> Python </a:t>
+            </a:r>
+            <a:r>
+              <a:rPr lang="nl-NL" dirty="0" err="1"/>
+              <a:t>algorithms</a:t>
+            </a:r>
+            <a:endParaRPr lang="nl-NL" dirty="0"/>
+          </a:p>
+        </p:txBody>
+      </p:sp>
+      <p:pic>
+        <p:nvPicPr>
+          <p:cNvPr id="11" name="Content Placeholder 10">
+            <a:extLst>
+              <a:ext uri="{FF2B5EF4-FFF2-40B4-BE49-F238E27FC236}">
+                <a16:creationId xmlns:a16="http://schemas.microsoft.com/office/drawing/2014/main" id="{792CC54D-36F2-4BEA-A7C7-0C24B13A845B}"/>
+              </a:ext>
+            </a:extLst>
+          </p:cNvPr>
+          <p:cNvPicPr>
+            <a:picLocks noGrp="1" noChangeAspect="1"/>
+          </p:cNvPicPr>
+          <p:nvPr>
+            <p:ph sz="half" idx="2"/>
+          </p:nvPr>
+        </p:nvPicPr>
+        <p:blipFill>
+          <a:blip r:embed="rId2">
+            <a:extLst>
+              <a:ext uri="{28A0092B-C50C-407E-A947-70E740481C1C}">
+                <a14:useLocalDpi xmlns:a14="http://schemas.microsoft.com/office/drawing/2010/main" val="0"/>
+              </a:ext>
+            </a:extLst>
+          </a:blip>
+          <a:stretch>
+            <a:fillRect/>
+          </a:stretch>
+        </p:blipFill>
+        <p:spPr bwMode="auto">
+          <a:xfrm>
+            <a:off x="6587331" y="1825625"/>
+            <a:ext cx="4351338" cy="4351338"/>
+          </a:xfrm>
+          <a:prstGeom prst="rect">
+            <a:avLst/>
+          </a:prstGeom>
+          <a:noFill/>
+          <a:extLst>
+            <a:ext uri="{909E8E84-426E-40DD-AFC4-6F175D3DCCD1}">
+              <a14:hiddenFill xmlns:a14="http://schemas.microsoft.com/office/drawing/2010/main">
+                <a:solidFill>
+                  <a:srgbClr val="FFFFFF"/>
+                </a:solidFill>
+              </a14:hiddenFill>
+            </a:ext>
+          </a:extLst>
+        </p:spPr>
+      </p:pic>
+    </p:spTree>
+    <p:extLst>
+      <p:ext uri="{BB962C8B-B14F-4D97-AF65-F5344CB8AC3E}">
+        <p14:creationId xmlns:p14="http://schemas.microsoft.com/office/powerpoint/2010/main" val="4023396365"/>
+      </p:ext>
+    </p:extLst>
+  </p:cSld>
+  <p:clrMapOvr>
+    <a:masterClrMapping/>
+  </p:clrMapOvr>
+</p:sld>
+</file>
+
+<file path=ppt/slides/slide30.xml><?xml version="1.0" encoding="utf-8"?>
 <p:sld xmlns:a="http://schemas.openxmlformats.org/drawingml/2006/main" xmlns:r="http://schemas.openxmlformats.org/officeDocument/2006/relationships" xmlns:p="http://schemas.openxmlformats.org/presentationml/2006/main">
   <p:cSld>
     <p:spTree>
@@ -12753,7 +13758,7 @@
                 <a:effectLst/>
                 <a:latin typeface="Mulish"/>
               </a:rPr>
-              <a:t>Who are the eldest: gold, silver, or bronze medal winners? Extend your algorithm to find out!</a:t>
+              <a:t>Who are the eldest on average: gold, silver, or bronze medal winners? Adjust/extend your algorithm to find out!</a:t>
             </a:r>
           </a:p>
           <a:p>
@@ -12799,7 +13804,7 @@
 </p:sld>
 </file>
 
-<file path=ppt/slides/slide29.xml><?xml version="1.0" encoding="utf-8"?>
+<file path=ppt/slides/slide31.xml><?xml version="1.0" encoding="utf-8"?>
 <p:sld xmlns:a="http://schemas.openxmlformats.org/drawingml/2006/main" xmlns:r="http://schemas.openxmlformats.org/officeDocument/2006/relationships" xmlns:p="http://schemas.openxmlformats.org/presentationml/2006/main">
   <p:cSld>
     <p:spTree>
@@ -13225,201 +14230,7 @@
 </p:sld>
 </file>
 
-<file path=ppt/slides/slide3.xml><?xml version="1.0" encoding="utf-8"?>
-<p:sld xmlns:a="http://schemas.openxmlformats.org/drawingml/2006/main" xmlns:r="http://schemas.openxmlformats.org/officeDocument/2006/relationships" xmlns:p="http://schemas.openxmlformats.org/presentationml/2006/main">
-  <p:cSld>
-    <p:spTree>
-      <p:nvGrpSpPr>
-        <p:cNvPr id="1" name=""/>
-        <p:cNvGrpSpPr/>
-        <p:nvPr/>
-      </p:nvGrpSpPr>
-      <p:grpSpPr>
-        <a:xfrm>
-          <a:off x="0" y="0"/>
-          <a:ext cx="0" cy="0"/>
-          <a:chOff x="0" y="0"/>
-          <a:chExt cx="0" cy="0"/>
-        </a:xfrm>
-      </p:grpSpPr>
-      <p:sp>
-        <p:nvSpPr>
-          <p:cNvPr id="4" name="Title 3">
-            <a:extLst>
-              <a:ext uri="{FF2B5EF4-FFF2-40B4-BE49-F238E27FC236}">
-                <a16:creationId xmlns:a16="http://schemas.microsoft.com/office/drawing/2014/main" id="{01556C73-952D-E378-3BAA-0914B6A56994}"/>
-              </a:ext>
-            </a:extLst>
-          </p:cNvPr>
-          <p:cNvSpPr>
-            <a:spLocks noGrp="1"/>
-          </p:cNvSpPr>
-          <p:nvPr>
-            <p:ph type="title"/>
-          </p:nvPr>
-        </p:nvSpPr>
-        <p:spPr/>
-        <p:txBody>
-          <a:bodyPr/>
-          <a:lstStyle/>
-          <a:p>
-            <a:r>
-              <a:rPr lang="en-US" dirty="0"/>
-              <a:t>Algorithm tools</a:t>
-            </a:r>
-            <a:endParaRPr lang="nl-NL" dirty="0"/>
-          </a:p>
-        </p:txBody>
-      </p:sp>
-      <p:sp>
-        <p:nvSpPr>
-          <p:cNvPr id="5" name="Content Placeholder 4">
-            <a:extLst>
-              <a:ext uri="{FF2B5EF4-FFF2-40B4-BE49-F238E27FC236}">
-                <a16:creationId xmlns:a16="http://schemas.microsoft.com/office/drawing/2014/main" id="{C64E3177-0198-CEBC-49F9-FD551DAA685B}"/>
-              </a:ext>
-            </a:extLst>
-          </p:cNvPr>
-          <p:cNvSpPr>
-            <a:spLocks noGrp="1"/>
-          </p:cNvSpPr>
-          <p:nvPr>
-            <p:ph sz="half" idx="1"/>
-          </p:nvPr>
-        </p:nvSpPr>
-        <p:spPr/>
-        <p:txBody>
-          <a:bodyPr/>
-          <a:lstStyle/>
-          <a:p>
-            <a:r>
-              <a:rPr lang="en-US" dirty="0"/>
-              <a:t>Algorithms need to communicate with the node and server</a:t>
-            </a:r>
-          </a:p>
-          <a:p>
-            <a:endParaRPr lang="en-US" dirty="0"/>
-          </a:p>
-          <a:p>
-            <a:r>
-              <a:rPr lang="nl-NL" dirty="0"/>
-              <a:t>Input </a:t>
-            </a:r>
-            <a:r>
-              <a:rPr lang="nl-NL" dirty="0" err="1"/>
-              <a:t>and</a:t>
-            </a:r>
-            <a:r>
-              <a:rPr lang="nl-NL" dirty="0"/>
-              <a:t> output are </a:t>
-            </a:r>
-            <a:r>
-              <a:rPr lang="nl-NL" dirty="0" err="1"/>
-              <a:t>handled</a:t>
-            </a:r>
-            <a:r>
-              <a:rPr lang="nl-NL" dirty="0"/>
-              <a:t> in standard way</a:t>
-            </a:r>
-          </a:p>
-          <a:p>
-            <a:endParaRPr lang="nl-NL" dirty="0"/>
-          </a:p>
-          <a:p>
-            <a:r>
-              <a:rPr lang="nl-NL" dirty="0" err="1"/>
-              <a:t>Algorithm</a:t>
-            </a:r>
-            <a:r>
-              <a:rPr lang="nl-NL" dirty="0"/>
-              <a:t> tools </a:t>
-            </a:r>
-            <a:r>
-              <a:rPr lang="nl-NL" dirty="0" err="1"/>
-              <a:t>provide</a:t>
-            </a:r>
-            <a:r>
-              <a:rPr lang="nl-NL" dirty="0"/>
-              <a:t> </a:t>
-            </a:r>
-            <a:r>
-              <a:rPr lang="nl-NL" dirty="0" err="1"/>
-              <a:t>this</a:t>
-            </a:r>
-            <a:r>
-              <a:rPr lang="nl-NL" dirty="0"/>
-              <a:t> </a:t>
-            </a:r>
-            <a:r>
-              <a:rPr lang="nl-NL" dirty="0" err="1"/>
-              <a:t>functionality</a:t>
-            </a:r>
-            <a:endParaRPr lang="nl-NL" dirty="0"/>
-          </a:p>
-        </p:txBody>
-      </p:sp>
-      <p:pic>
-        <p:nvPicPr>
-          <p:cNvPr id="11" name="Content Placeholder 10">
-            <a:extLst>
-              <a:ext uri="{FF2B5EF4-FFF2-40B4-BE49-F238E27FC236}">
-                <a16:creationId xmlns:a16="http://schemas.microsoft.com/office/drawing/2014/main" id="{792CC54D-36F2-4BEA-A7C7-0C24B13A845B}"/>
-              </a:ext>
-            </a:extLst>
-          </p:cNvPr>
-          <p:cNvPicPr>
-            <a:picLocks noGrp="1" noChangeAspect="1"/>
-          </p:cNvPicPr>
-          <p:nvPr>
-            <p:ph sz="half" idx="2"/>
-          </p:nvPr>
-        </p:nvPicPr>
-        <p:blipFill>
-          <a:blip r:embed="rId2">
-            <a:extLst>
-              <a:ext uri="{28A0092B-C50C-407E-A947-70E740481C1C}">
-                <a14:useLocalDpi xmlns:a14="http://schemas.microsoft.com/office/drawing/2010/main" val="0"/>
-              </a:ext>
-            </a:extLst>
-          </a:blip>
-          <a:stretch>
-            <a:fillRect/>
-          </a:stretch>
-        </p:blipFill>
-        <p:spPr bwMode="auto">
-          <a:xfrm>
-            <a:off x="6587331" y="1825625"/>
-            <a:ext cx="4351338" cy="4351338"/>
-          </a:xfrm>
-          <a:prstGeom prst="rect">
-            <a:avLst/>
-          </a:prstGeom>
-          <a:noFill/>
-          <a:extLst>
-            <a:ext uri="{909E8E84-426E-40DD-AFC4-6F175D3DCCD1}">
-              <a14:hiddenFill xmlns:a14="http://schemas.microsoft.com/office/drawing/2010/main">
-                <a:solidFill>
-                  <a:srgbClr val="FFFFFF"/>
-                </a:solidFill>
-              </a14:hiddenFill>
-            </a:ext>
-          </a:extLst>
-        </p:spPr>
-      </p:pic>
-    </p:spTree>
-    <p:extLst>
-      <p:ext uri="{BB962C8B-B14F-4D97-AF65-F5344CB8AC3E}">
-        <p14:creationId xmlns:p14="http://schemas.microsoft.com/office/powerpoint/2010/main" val="4023396365"/>
-      </p:ext>
-    </p:extLst>
-  </p:cSld>
-  <p:clrMapOvr>
-    <a:masterClrMapping/>
-  </p:clrMapOvr>
-</p:sld>
-</file>
-
-<file path=ppt/slides/slide30.xml><?xml version="1.0" encoding="utf-8"?>
+<file path=ppt/slides/slide32.xml><?xml version="1.0" encoding="utf-8"?>
 <p:sld xmlns:a="http://schemas.openxmlformats.org/drawingml/2006/main" xmlns:r="http://schemas.openxmlformats.org/officeDocument/2006/relationships" xmlns:p="http://schemas.openxmlformats.org/presentationml/2006/main">
   <p:cSld>
     <p:spTree>
@@ -13676,7 +14487,7 @@
 </p:sld>
 </file>
 
-<file path=ppt/slides/slide31.xml><?xml version="1.0" encoding="utf-8"?>
+<file path=ppt/slides/slide33.xml><?xml version="1.0" encoding="utf-8"?>
 <p:sld xmlns:a="http://schemas.openxmlformats.org/drawingml/2006/main" xmlns:r="http://schemas.openxmlformats.org/officeDocument/2006/relationships" xmlns:p="http://schemas.openxmlformats.org/presentationml/2006/main">
   <p:cSld>
     <p:spTree>
@@ -14095,7 +14906,7 @@
 </p:sld>
 </file>
 
-<file path=ppt/slides/slide32.xml><?xml version="1.0" encoding="utf-8"?>
+<file path=ppt/slides/slide34.xml><?xml version="1.0" encoding="utf-8"?>
 <p:sld xmlns:a="http://schemas.openxmlformats.org/drawingml/2006/main" xmlns:r="http://schemas.openxmlformats.org/officeDocument/2006/relationships" xmlns:p="http://schemas.openxmlformats.org/presentationml/2006/main">
   <p:cSld>
     <p:spTree>
@@ -14143,33 +14954,257 @@
       </p:sp>
       <p:sp>
         <p:nvSpPr>
-          <p:cNvPr id="3" name="Content Placeholder 2">
-            <a:extLst>
-              <a:ext uri="{FF2B5EF4-FFF2-40B4-BE49-F238E27FC236}">
-                <a16:creationId xmlns:a16="http://schemas.microsoft.com/office/drawing/2014/main" id="{AB8614E9-0FB3-8882-95AE-97AEBBF72556}"/>
-              </a:ext>
-            </a:extLst>
-          </p:cNvPr>
-          <p:cNvSpPr>
-            <a:spLocks noGrp="1"/>
+          <p:cNvPr id="6" name="Text Placeholder 3">
+            <a:extLst>
+              <a:ext uri="{FF2B5EF4-FFF2-40B4-BE49-F238E27FC236}">
+                <a16:creationId xmlns:a16="http://schemas.microsoft.com/office/drawing/2014/main" id="{7F1B8EAD-A569-F2F5-8F7C-5F566396903F}"/>
+              </a:ext>
+            </a:extLst>
+          </p:cNvPr>
+          <p:cNvSpPr txBox="1">
+            <a:spLocks/>
           </p:cNvSpPr>
-          <p:nvPr>
-            <p:ph idx="1"/>
-          </p:nvPr>
-        </p:nvSpPr>
-        <p:spPr/>
+          <p:nvPr/>
+        </p:nvSpPr>
+        <p:spPr>
+          <a:xfrm>
+            <a:off x="838200" y="1200751"/>
+            <a:ext cx="3932237" cy="3811588"/>
+          </a:xfrm>
+          <a:prstGeom prst="rect">
+            <a:avLst/>
+          </a:prstGeom>
+        </p:spPr>
         <p:txBody>
           <a:bodyPr/>
-          <a:lstStyle/>
-          <a:p>
-            <a:r>
-              <a:rPr lang="en-US" dirty="0"/>
-              <a:t>TODO</a:t>
-            </a:r>
-            <a:endParaRPr lang="nl-NL" dirty="0"/>
+          <a:lstStyle>
+            <a:lvl1pPr marL="228600" indent="-228600" algn="l" defTabSz="914400" rtl="0" eaLnBrk="1" latinLnBrk="0" hangingPunct="1">
+              <a:lnSpc>
+                <a:spcPct val="90000"/>
+              </a:lnSpc>
+              <a:spcBef>
+                <a:spcPts val="1000"/>
+              </a:spcBef>
+              <a:buFont typeface="Arial" panose="020B0604020202020204" pitchFamily="34" charset="0"/>
+              <a:buChar char="•"/>
+              <a:defRPr sz="2800" kern="1200">
+                <a:solidFill>
+                  <a:srgbClr val="0F497B"/>
+                </a:solidFill>
+                <a:latin typeface="+mn-lt"/>
+                <a:ea typeface="+mn-ea"/>
+                <a:cs typeface="+mn-cs"/>
+              </a:defRPr>
+            </a:lvl1pPr>
+            <a:lvl2pPr marL="685800" indent="-228600" algn="l" defTabSz="914400" rtl="0" eaLnBrk="1" latinLnBrk="0" hangingPunct="1">
+              <a:lnSpc>
+                <a:spcPct val="90000"/>
+              </a:lnSpc>
+              <a:spcBef>
+                <a:spcPts val="500"/>
+              </a:spcBef>
+              <a:buFont typeface="Arial" panose="020B0604020202020204" pitchFamily="34" charset="0"/>
+              <a:buChar char="•"/>
+              <a:defRPr sz="2400" kern="1200">
+                <a:solidFill>
+                  <a:srgbClr val="0F497B"/>
+                </a:solidFill>
+                <a:latin typeface="+mn-lt"/>
+                <a:ea typeface="+mn-ea"/>
+                <a:cs typeface="+mn-cs"/>
+              </a:defRPr>
+            </a:lvl2pPr>
+            <a:lvl3pPr marL="1143000" indent="-228600" algn="l" defTabSz="914400" rtl="0" eaLnBrk="1" latinLnBrk="0" hangingPunct="1">
+              <a:lnSpc>
+                <a:spcPct val="90000"/>
+              </a:lnSpc>
+              <a:spcBef>
+                <a:spcPts val="500"/>
+              </a:spcBef>
+              <a:buFont typeface="Arial" panose="020B0604020202020204" pitchFamily="34" charset="0"/>
+              <a:buChar char="•"/>
+              <a:defRPr sz="2000" kern="1200">
+                <a:solidFill>
+                  <a:srgbClr val="0F497B"/>
+                </a:solidFill>
+                <a:latin typeface="+mn-lt"/>
+                <a:ea typeface="+mn-ea"/>
+                <a:cs typeface="+mn-cs"/>
+              </a:defRPr>
+            </a:lvl3pPr>
+            <a:lvl4pPr marL="1600200" indent="-228600" algn="l" defTabSz="914400" rtl="0" eaLnBrk="1" latinLnBrk="0" hangingPunct="1">
+              <a:lnSpc>
+                <a:spcPct val="90000"/>
+              </a:lnSpc>
+              <a:spcBef>
+                <a:spcPts val="500"/>
+              </a:spcBef>
+              <a:buFont typeface="Arial" panose="020B0604020202020204" pitchFamily="34" charset="0"/>
+              <a:buChar char="•"/>
+              <a:defRPr sz="1800" kern="1200">
+                <a:solidFill>
+                  <a:srgbClr val="0F497B"/>
+                </a:solidFill>
+                <a:latin typeface="+mn-lt"/>
+                <a:ea typeface="+mn-ea"/>
+                <a:cs typeface="+mn-cs"/>
+              </a:defRPr>
+            </a:lvl4pPr>
+            <a:lvl5pPr marL="2057400" indent="-228600" algn="l" defTabSz="914400" rtl="0" eaLnBrk="1" latinLnBrk="0" hangingPunct="1">
+              <a:lnSpc>
+                <a:spcPct val="90000"/>
+              </a:lnSpc>
+              <a:spcBef>
+                <a:spcPts val="500"/>
+              </a:spcBef>
+              <a:buFont typeface="Arial" panose="020B0604020202020204" pitchFamily="34" charset="0"/>
+              <a:buChar char="•"/>
+              <a:defRPr sz="1800" kern="1200">
+                <a:solidFill>
+                  <a:srgbClr val="0F497B"/>
+                </a:solidFill>
+                <a:latin typeface="+mn-lt"/>
+                <a:ea typeface="+mn-ea"/>
+                <a:cs typeface="+mn-cs"/>
+              </a:defRPr>
+            </a:lvl5pPr>
+            <a:lvl6pPr marL="2514600" indent="-228600" algn="l" defTabSz="914400" rtl="0" eaLnBrk="1" latinLnBrk="0" hangingPunct="1">
+              <a:lnSpc>
+                <a:spcPct val="90000"/>
+              </a:lnSpc>
+              <a:spcBef>
+                <a:spcPts val="500"/>
+              </a:spcBef>
+              <a:buFont typeface="Arial" panose="020B0604020202020204" pitchFamily="34" charset="0"/>
+              <a:buChar char="•"/>
+              <a:defRPr sz="1800" kern="1200">
+                <a:solidFill>
+                  <a:schemeClr val="tx1"/>
+                </a:solidFill>
+                <a:latin typeface="+mn-lt"/>
+                <a:ea typeface="+mn-ea"/>
+                <a:cs typeface="+mn-cs"/>
+              </a:defRPr>
+            </a:lvl6pPr>
+            <a:lvl7pPr marL="2971800" indent="-228600" algn="l" defTabSz="914400" rtl="0" eaLnBrk="1" latinLnBrk="0" hangingPunct="1">
+              <a:lnSpc>
+                <a:spcPct val="90000"/>
+              </a:lnSpc>
+              <a:spcBef>
+                <a:spcPts val="500"/>
+              </a:spcBef>
+              <a:buFont typeface="Arial" panose="020B0604020202020204" pitchFamily="34" charset="0"/>
+              <a:buChar char="•"/>
+              <a:defRPr sz="1800" kern="1200">
+                <a:solidFill>
+                  <a:schemeClr val="tx1"/>
+                </a:solidFill>
+                <a:latin typeface="+mn-lt"/>
+                <a:ea typeface="+mn-ea"/>
+                <a:cs typeface="+mn-cs"/>
+              </a:defRPr>
+            </a:lvl7pPr>
+            <a:lvl8pPr marL="3429000" indent="-228600" algn="l" defTabSz="914400" rtl="0" eaLnBrk="1" latinLnBrk="0" hangingPunct="1">
+              <a:lnSpc>
+                <a:spcPct val="90000"/>
+              </a:lnSpc>
+              <a:spcBef>
+                <a:spcPts val="500"/>
+              </a:spcBef>
+              <a:buFont typeface="Arial" panose="020B0604020202020204" pitchFamily="34" charset="0"/>
+              <a:buChar char="•"/>
+              <a:defRPr sz="1800" kern="1200">
+                <a:solidFill>
+                  <a:schemeClr val="tx1"/>
+                </a:solidFill>
+                <a:latin typeface="+mn-lt"/>
+                <a:ea typeface="+mn-ea"/>
+                <a:cs typeface="+mn-cs"/>
+              </a:defRPr>
+            </a:lvl8pPr>
+            <a:lvl9pPr marL="3886200" indent="-228600" algn="l" defTabSz="914400" rtl="0" eaLnBrk="1" latinLnBrk="0" hangingPunct="1">
+              <a:lnSpc>
+                <a:spcPct val="90000"/>
+              </a:lnSpc>
+              <a:spcBef>
+                <a:spcPts val="500"/>
+              </a:spcBef>
+              <a:buFont typeface="Arial" panose="020B0604020202020204" pitchFamily="34" charset="0"/>
+              <a:buChar char="•"/>
+              <a:defRPr sz="1800" kern="1200">
+                <a:solidFill>
+                  <a:schemeClr val="tx1"/>
+                </a:solidFill>
+                <a:latin typeface="+mn-lt"/>
+                <a:ea typeface="+mn-ea"/>
+                <a:cs typeface="+mn-cs"/>
+              </a:defRPr>
+            </a:lvl9pPr>
+          </a:lstStyle>
+          <a:p>
+            <a:pPr>
+              <a:lnSpc>
+                <a:spcPct val="150000"/>
+              </a:lnSpc>
+            </a:pPr>
+            <a:r>
+              <a:rPr lang="en-GB" sz="2000" dirty="0"/>
+              <a:t>Different parts of the algorithm will be split in different parts to improve reusability</a:t>
+            </a:r>
+          </a:p>
+          <a:p>
+            <a:pPr>
+              <a:lnSpc>
+                <a:spcPct val="150000"/>
+              </a:lnSpc>
+            </a:pPr>
+            <a:r>
+              <a:rPr lang="en-GB" sz="2000" dirty="0"/>
+              <a:t>UI/UX experience will improve because we know more about the dataset</a:t>
+            </a:r>
+          </a:p>
+          <a:p>
+            <a:pPr>
+              <a:lnSpc>
+                <a:spcPct val="150000"/>
+              </a:lnSpc>
+            </a:pPr>
+            <a:r>
+              <a:rPr lang="en-GB" sz="2000" dirty="0"/>
+              <a:t>Re-using previous data extraction step is quicker and less error-prone</a:t>
+            </a:r>
           </a:p>
         </p:txBody>
       </p:sp>
+      <p:pic>
+        <p:nvPicPr>
+          <p:cNvPr id="7" name="Picture Placeholder 5">
+            <a:extLst>
+              <a:ext uri="{FF2B5EF4-FFF2-40B4-BE49-F238E27FC236}">
+                <a16:creationId xmlns:a16="http://schemas.microsoft.com/office/drawing/2014/main" id="{B80DE399-382F-D5D0-2BA0-BBE3AD390916}"/>
+              </a:ext>
+            </a:extLst>
+          </p:cNvPr>
+          <p:cNvPicPr>
+            <a:picLocks noChangeAspect="1"/>
+          </p:cNvPicPr>
+          <p:nvPr/>
+        </p:nvPicPr>
+        <p:blipFill>
+          <a:blip r:embed="rId2"/>
+          <a:srcRect l="1178" r="1178"/>
+          <a:stretch/>
+        </p:blipFill>
+        <p:spPr>
+          <a:xfrm>
+            <a:off x="5162328" y="1343560"/>
+            <a:ext cx="6172200" cy="4873625"/>
+          </a:xfrm>
+          <a:prstGeom prst="rect">
+            <a:avLst/>
+          </a:prstGeom>
+        </p:spPr>
+      </p:pic>
     </p:spTree>
     <p:extLst>
       <p:ext uri="{BB962C8B-B14F-4D97-AF65-F5344CB8AC3E}">
@@ -14183,7 +15218,7 @@
 </p:sld>
 </file>
 
-<file path=ppt/slides/slide33.xml><?xml version="1.0" encoding="utf-8"?>
+<file path=ppt/slides/slide35.xml><?xml version="1.0" encoding="utf-8"?>
 <p:sld xmlns:a="http://schemas.openxmlformats.org/drawingml/2006/main" xmlns:r="http://schemas.openxmlformats.org/officeDocument/2006/relationships" xmlns:p="http://schemas.openxmlformats.org/presentationml/2006/main">
   <p:cSld>
     <p:spTree>
@@ -15004,7 +16039,7 @@
         </p:nvSpPr>
         <p:spPr>
           <a:xfrm>
-            <a:off x="7527637" y="2759042"/>
+            <a:off x="7500205" y="1882607"/>
             <a:ext cx="3992418" cy="3226122"/>
           </a:xfrm>
         </p:spPr>
@@ -15057,6 +16092,23 @@
               <a:rPr lang="en-GB" sz="1800" dirty="0"/>
               <a:t>Reduces workload of the algorithm developer</a:t>
             </a:r>
+          </a:p>
+          <a:p>
+            <a:pPr>
+              <a:lnSpc>
+                <a:spcPct val="150000"/>
+              </a:lnSpc>
+            </a:pPr>
+            <a:endParaRPr lang="en-GB" sz="1800" dirty="0"/>
+          </a:p>
+          <a:p>
+            <a:pPr marL="0" indent="0">
+              <a:lnSpc>
+                <a:spcPct val="150000"/>
+              </a:lnSpc>
+              <a:buNone/>
+            </a:pPr>
+            <a:endParaRPr lang="en-GB" sz="1800" dirty="0"/>
           </a:p>
         </p:txBody>
       </p:sp>
@@ -15103,6 +16155,173 @@
           </a:fontRef>
         </p:style>
       </p:cxnSp>
+      <p:grpSp>
+        <p:nvGrpSpPr>
+          <p:cNvPr id="3" name="Group 2">
+            <a:extLst>
+              <a:ext uri="{FF2B5EF4-FFF2-40B4-BE49-F238E27FC236}">
+                <a16:creationId xmlns:a16="http://schemas.microsoft.com/office/drawing/2014/main" id="{98F0551C-7FB3-3B3C-095F-4C0C35B8DFF1}"/>
+              </a:ext>
+            </a:extLst>
+          </p:cNvPr>
+          <p:cNvGrpSpPr/>
+          <p:nvPr/>
+        </p:nvGrpSpPr>
+        <p:grpSpPr>
+          <a:xfrm>
+            <a:off x="2782622" y="5172670"/>
+            <a:ext cx="6315658" cy="2140951"/>
+            <a:chOff x="941689" y="864637"/>
+            <a:chExt cx="4323960" cy="1352390"/>
+          </a:xfrm>
+        </p:grpSpPr>
+        <p:sp>
+          <p:nvSpPr>
+            <p:cNvPr id="4" name="Rectangle 3">
+              <a:extLst>
+                <a:ext uri="{FF2B5EF4-FFF2-40B4-BE49-F238E27FC236}">
+                  <a16:creationId xmlns:a16="http://schemas.microsoft.com/office/drawing/2014/main" id="{AA839DA1-5899-2844-4CC9-EABC5630E515}"/>
+                </a:ext>
+              </a:extLst>
+            </p:cNvPr>
+            <p:cNvSpPr/>
+            <p:nvPr/>
+          </p:nvSpPr>
+          <p:spPr>
+            <a:xfrm>
+              <a:off x="941689" y="864637"/>
+              <a:ext cx="4323960" cy="890429"/>
+            </a:xfrm>
+            <a:prstGeom prst="rect">
+              <a:avLst/>
+            </a:prstGeom>
+            <a:solidFill>
+              <a:srgbClr val="FFC000"/>
+            </a:solidFill>
+            <a:ln>
+              <a:noFill/>
+            </a:ln>
+          </p:spPr>
+          <p:style>
+            <a:lnRef idx="2">
+              <a:schemeClr val="accent1">
+                <a:shade val="15000"/>
+              </a:schemeClr>
+            </a:lnRef>
+            <a:fillRef idx="1">
+              <a:schemeClr val="accent1"/>
+            </a:fillRef>
+            <a:effectRef idx="0">
+              <a:schemeClr val="accent1"/>
+            </a:effectRef>
+            <a:fontRef idx="minor">
+              <a:schemeClr val="lt1"/>
+            </a:fontRef>
+          </p:style>
+          <p:txBody>
+            <a:bodyPr rtlCol="0" anchor="ctr"/>
+            <a:lstStyle/>
+            <a:p>
+              <a:endParaRPr lang="en-GB" dirty="0"/>
+            </a:p>
+          </p:txBody>
+        </p:sp>
+        <p:sp>
+          <p:nvSpPr>
+            <p:cNvPr id="6" name="TextBox 5">
+              <a:extLst>
+                <a:ext uri="{FF2B5EF4-FFF2-40B4-BE49-F238E27FC236}">
+                  <a16:creationId xmlns:a16="http://schemas.microsoft.com/office/drawing/2014/main" id="{5743D4DC-D784-24C1-EF28-680CCE19AE70}"/>
+                </a:ext>
+              </a:extLst>
+            </p:cNvPr>
+            <p:cNvSpPr txBox="1"/>
+            <p:nvPr/>
+          </p:nvSpPr>
+          <p:spPr>
+            <a:xfrm>
+              <a:off x="1311216" y="1016698"/>
+              <a:ext cx="3805143" cy="1200329"/>
+            </a:xfrm>
+            <a:prstGeom prst="rect">
+              <a:avLst/>
+            </a:prstGeom>
+            <a:noFill/>
+          </p:spPr>
+          <p:txBody>
+            <a:bodyPr wrap="square" rtlCol="0">
+              <a:spAutoFit/>
+            </a:bodyPr>
+            <a:lstStyle/>
+            <a:p>
+              <a:r>
+                <a:rPr lang="en-GB" b="1" dirty="0">
+                  <a:solidFill>
+                    <a:schemeClr val="bg1"/>
+                  </a:solidFill>
+                </a:rPr>
+                <a:t>NOTE</a:t>
+              </a:r>
+              <a:br>
+                <a:rPr lang="en-GB" b="1" dirty="0">
+                  <a:solidFill>
+                    <a:schemeClr val="bg1"/>
+                  </a:solidFill>
+                </a:rPr>
+              </a:br>
+              <a:r>
+                <a:rPr lang="en-GB" dirty="0">
+                  <a:solidFill>
+                    <a:schemeClr val="bg1"/>
+                  </a:solidFill>
+                </a:rPr>
+                <a:t>Environment variables are also used in the wrapper to locate the database, input data, and the token</a:t>
+              </a:r>
+              <a:endParaRPr lang="en-GB" sz="1400" dirty="0">
+                <a:solidFill>
+                  <a:schemeClr val="bg1"/>
+                </a:solidFill>
+              </a:endParaRPr>
+            </a:p>
+          </p:txBody>
+        </p:sp>
+        <p:pic>
+          <p:nvPicPr>
+            <p:cNvPr id="7" name="Graphic 6" descr="Lightning bolt with solid fill">
+              <a:extLst>
+                <a:ext uri="{FF2B5EF4-FFF2-40B4-BE49-F238E27FC236}">
+                  <a16:creationId xmlns:a16="http://schemas.microsoft.com/office/drawing/2014/main" id="{DE1C4B6F-669E-6463-8D2C-1C28E7004A21}"/>
+                </a:ext>
+              </a:extLst>
+            </p:cNvPr>
+            <p:cNvPicPr>
+              <a:picLocks noChangeAspect="1"/>
+            </p:cNvPicPr>
+            <p:nvPr/>
+          </p:nvPicPr>
+          <p:blipFill>
+            <a:blip r:embed="rId3">
+              <a:extLst>
+                <a:ext uri="{96DAC541-7B7A-43D3-8B79-37D633B846F1}">
+                  <asvg:svgBlip xmlns:asvg="http://schemas.microsoft.com/office/drawing/2016/SVG/main" r:embed="rId4"/>
+                </a:ext>
+              </a:extLst>
+            </a:blip>
+            <a:stretch>
+              <a:fillRect/>
+            </a:stretch>
+          </p:blipFill>
+          <p:spPr>
+            <a:xfrm>
+              <a:off x="1001543" y="1050785"/>
+              <a:ext cx="309674" cy="309674"/>
+            </a:xfrm>
+            <a:prstGeom prst="rect">
+              <a:avLst/>
+            </a:prstGeom>
+          </p:spPr>
+        </p:pic>
+      </p:grpSp>
     </p:spTree>
     <p:extLst>
       <p:ext uri="{BB962C8B-B14F-4D97-AF65-F5344CB8AC3E}">
@@ -16169,6 +17388,11 @@
 </file>
 
 <file path=customXml/item1.xml><?xml version="1.0" encoding="utf-8"?>
+<?mso-contentType ?>
+<SharedContentType xmlns="Microsoft.SharePoint.Taxonomy.ContentTypeSync" SourceId="cb8255a1-8ba2-4481-a478-0e49daae7cb3" ContentTypeId="0x0101" PreviousValue="false"/>
+</file>
+
+<file path=customXml/item2.xml><?xml version="1.0" encoding="utf-8"?>
 <ct:contentTypeSchema xmlns:ct="http://schemas.microsoft.com/office/2006/metadata/contentType" xmlns:ma="http://schemas.microsoft.com/office/2006/metadata/properties/metaAttributes" ct:_="" ma:_="" ma:contentTypeName="Document" ma:contentTypeID="0x0101001017A668ECEA0E4CB5F5BA1474719657" ma:contentTypeVersion="19" ma:contentTypeDescription="Een nieuw document maken." ma:contentTypeScope="" ma:versionID="691d100ec3128a2c1a276a8c04354e84">
   <xsd:schema xmlns:xsd="http://www.w3.org/2001/XMLSchema" xmlns:xs="http://www.w3.org/2001/XMLSchema" xmlns:p="http://schemas.microsoft.com/office/2006/metadata/properties" xmlns:ns2="6016969e-8fe7-4fbb-8fca-8358746b717a" xmlns:ns3="e22ccf6f-9e4a-4792-a2c9-4cf9f04764f4" targetNamespace="http://schemas.microsoft.com/office/2006/metadata/properties" ma:root="true" ma:fieldsID="fa643780ff8ce0eaca6f411e1ebff397" ns2:_="" ns3:_="">
     <xsd:import namespace="6016969e-8fe7-4fbb-8fca-8358746b717a"/>
@@ -16429,12 +17653,16 @@
 </ct:contentTypeSchema>
 </file>
 
-<file path=customXml/item2.xml><?xml version="1.0" encoding="utf-8"?>
+<file path=customXml/item3.xml><?xml version="1.0" encoding="utf-8"?>
 <?mso-contentType ?>
-<SharedContentType xmlns="Microsoft.SharePoint.Taxonomy.ContentTypeSync" SourceId="cb8255a1-8ba2-4481-a478-0e49daae7cb3" ContentTypeId="0x0101" PreviousValue="false"/>
+<FormTemplates xmlns="http://schemas.microsoft.com/sharepoint/v3/contenttype/forms">
+  <Display>DocumentLibraryForm</Display>
+  <Edit>DocumentLibraryForm</Edit>
+  <New>DocumentLibraryForm</New>
+</FormTemplates>
 </file>
 
-<file path=customXml/item3.xml><?xml version="1.0" encoding="utf-8"?>
+<file path=customXml/item4.xml><?xml version="1.0" encoding="utf-8"?>
 <p:properties xmlns:p="http://schemas.microsoft.com/office/2006/metadata/properties" xmlns:xsi="http://www.w3.org/2001/XMLSchema-instance" xmlns:pc="http://schemas.microsoft.com/office/infopath/2007/PartnerControls">
   <documentManagement>
     <_Flow_SignoffStatus xmlns="6016969e-8fe7-4fbb-8fca-8358746b717a" xsi:nil="true"/>
@@ -16454,16 +17682,15 @@
 </p:properties>
 </file>
 
-<file path=customXml/item4.xml><?xml version="1.0" encoding="utf-8"?>
-<?mso-contentType ?>
-<FormTemplates xmlns="http://schemas.microsoft.com/sharepoint/v3/contenttype/forms">
-  <Display>DocumentLibraryForm</Display>
-  <Edit>DocumentLibraryForm</Edit>
-  <New>DocumentLibraryForm</New>
-</FormTemplates>
+<file path=customXml/itemProps1.xml><?xml version="1.0" encoding="utf-8"?>
+<ds:datastoreItem xmlns:ds="http://schemas.openxmlformats.org/officeDocument/2006/customXml" ds:itemID="{18D5FC34-2DFB-4B26-997F-A393814B22D5}">
+  <ds:schemaRefs>
+    <ds:schemaRef ds:uri="Microsoft.SharePoint.Taxonomy.ContentTypeSync"/>
+  </ds:schemaRefs>
+</ds:datastoreItem>
 </file>
 
-<file path=customXml/itemProps1.xml><?xml version="1.0" encoding="utf-8"?>
+<file path=customXml/itemProps2.xml><?xml version="1.0" encoding="utf-8"?>
 <ds:datastoreItem xmlns:ds="http://schemas.openxmlformats.org/officeDocument/2006/customXml" ds:itemID="{9C212D50-8849-43D3-8E71-3523508F0BDD}">
   <ds:schemaRefs>
     <ds:schemaRef ds:uri="http://schemas.microsoft.com/office/2006/metadata/contentType"/>
@@ -16482,15 +17709,15 @@
 </ds:datastoreItem>
 </file>
 
-<file path=customXml/itemProps2.xml><?xml version="1.0" encoding="utf-8"?>
-<ds:datastoreItem xmlns:ds="http://schemas.openxmlformats.org/officeDocument/2006/customXml" ds:itemID="{18D5FC34-2DFB-4B26-997F-A393814B22D5}">
+<file path=customXml/itemProps3.xml><?xml version="1.0" encoding="utf-8"?>
+<ds:datastoreItem xmlns:ds="http://schemas.openxmlformats.org/officeDocument/2006/customXml" ds:itemID="{9F543B1F-55D9-42A8-988B-6A0806E99B30}">
   <ds:schemaRefs>
-    <ds:schemaRef ds:uri="Microsoft.SharePoint.Taxonomy.ContentTypeSync"/>
+    <ds:schemaRef ds:uri="http://schemas.microsoft.com/sharepoint/v3/contenttype/forms"/>
   </ds:schemaRefs>
 </ds:datastoreItem>
 </file>
 
-<file path=customXml/itemProps3.xml><?xml version="1.0" encoding="utf-8"?>
+<file path=customXml/itemProps4.xml><?xml version="1.0" encoding="utf-8"?>
 <ds:datastoreItem xmlns:ds="http://schemas.openxmlformats.org/officeDocument/2006/customXml" ds:itemID="{1CB03124-27B6-4074-AE06-F0680139A6C5}">
   <ds:schemaRefs>
     <ds:schemaRef ds:uri="6016969e-8fe7-4fbb-8fca-8358746b717a"/>
@@ -16505,12 +17732,4 @@
     <ds:schemaRef ds:uri="http://schemas.microsoft.com/office/2006/metadata/properties"/>
   </ds:schemaRefs>
 </ds:datastoreItem>
-</file>
-
-<file path=customXml/itemProps4.xml><?xml version="1.0" encoding="utf-8"?>
-<ds:datastoreItem xmlns:ds="http://schemas.openxmlformats.org/officeDocument/2006/customXml" ds:itemID="{9F543B1F-55D9-42A8-988B-6A0806E99B30}">
-  <ds:schemaRefs>
-    <ds:schemaRef ds:uri="http://schemas.microsoft.com/sharepoint/v3/contenttype/forms"/>
-  </ds:schemaRefs>
-</ds:datastoreItem>
 </file>
</xml_diff>